<commit_message>
Country road west virginia take me home
</commit_message>
<xml_diff>
--- a/Poster.pptx
+++ b/Poster.pptx
@@ -10385,7 +10385,7 @@
           <a:bodyPr wrap="none" anchor="ctr"/>
           <a:lstStyle/>
           <a:p>
-            <a:endParaRPr lang="en-DK"/>
+            <a:endParaRPr lang="en-DK" dirty="0"/>
           </a:p>
         </p:txBody>
       </p:sp>
@@ -10579,7 +10579,7 @@
         </p:blipFill>
         <p:spPr bwMode="auto">
           <a:xfrm>
-            <a:off x="33502600" y="0"/>
+            <a:off x="32317531" y="122149"/>
             <a:ext cx="14395450" cy="20294600"/>
           </a:xfrm>
           <a:prstGeom prst="rect">
@@ -10642,17 +10642,91 @@
           <a:lstStyle/>
           <a:p>
             <a:r>
-              <a:rPr lang="da-DK" altLang="en-DK"/>
-              <a:t>Titel </a:t>
-            </a:r>
-            <a:r>
-              <a:rPr lang="da-DK" altLang="en-DK">
-                <a:solidFill>
-                  <a:srgbClr val="BD2A33"/>
-                </a:solidFill>
-              </a:rPr>
-              <a:t>(3 varianter Arial Bold 1. 100/120pt, 2. 160/170pt, 3. 200/220pt. )</a:t>
-            </a:r>
+              <a:rPr lang="da-DK" altLang="en-DK" dirty="0" err="1">
+                <a:solidFill>
+                  <a:srgbClr val="C00000"/>
+                </a:solidFill>
+              </a:rPr>
+              <a:t>Implementing</a:t>
+            </a:r>
+            <a:r>
+              <a:rPr lang="da-DK" altLang="en-DK" dirty="0">
+                <a:solidFill>
+                  <a:srgbClr val="C00000"/>
+                </a:solidFill>
+              </a:rPr>
+              <a:t> motor </a:t>
+            </a:r>
+            <a:r>
+              <a:rPr lang="da-DK" altLang="en-DK" dirty="0" err="1">
+                <a:solidFill>
+                  <a:srgbClr val="C00000"/>
+                </a:solidFill>
+              </a:rPr>
+              <a:t>control</a:t>
+            </a:r>
+            <a:r>
+              <a:rPr lang="da-DK" altLang="en-DK" dirty="0">
+                <a:solidFill>
+                  <a:srgbClr val="C00000"/>
+                </a:solidFill>
+              </a:rPr>
+              <a:t> </a:t>
+            </a:r>
+            <a:br>
+              <a:rPr lang="da-DK" altLang="en-DK" dirty="0">
+                <a:solidFill>
+                  <a:srgbClr val="C00000"/>
+                </a:solidFill>
+              </a:rPr>
+            </a:br>
+            <a:r>
+              <a:rPr lang="da-DK" altLang="en-DK" sz="8800" dirty="0">
+                <a:solidFill>
+                  <a:schemeClr val="bg1">
+                    <a:lumMod val="65000"/>
+                  </a:schemeClr>
+                </a:solidFill>
+              </a:rPr>
+              <a:t>with </a:t>
+            </a:r>
+            <a:r>
+              <a:rPr lang="da-DK" altLang="en-DK" sz="8800" dirty="0" err="1">
+                <a:solidFill>
+                  <a:schemeClr val="bg1">
+                    <a:lumMod val="65000"/>
+                  </a:schemeClr>
+                </a:solidFill>
+              </a:rPr>
+              <a:t>embedded</a:t>
+            </a:r>
+            <a:r>
+              <a:rPr lang="da-DK" altLang="en-DK" sz="8800" dirty="0">
+                <a:solidFill>
+                  <a:schemeClr val="bg1">
+                    <a:lumMod val="65000"/>
+                  </a:schemeClr>
+                </a:solidFill>
+              </a:rPr>
+              <a:t> </a:t>
+            </a:r>
+            <a:r>
+              <a:rPr lang="da-DK" altLang="en-DK" sz="8800" dirty="0" err="1">
+                <a:solidFill>
+                  <a:schemeClr val="bg1">
+                    <a:lumMod val="65000"/>
+                  </a:schemeClr>
+                </a:solidFill>
+              </a:rPr>
+              <a:t>electronics</a:t>
+            </a:r>
+            <a:endParaRPr lang="da-DK" altLang="en-DK" sz="9600" dirty="0">
+              <a:solidFill>
+                <a:schemeClr val="bg1">
+                  <a:lumMod val="65000"/>
+                </a:schemeClr>
+              </a:solidFill>
+            </a:endParaRPr>
           </a:p>
         </p:txBody>
       </p:sp>
@@ -10761,7 +10835,7 @@
         </p:nvSpPr>
         <p:spPr bwMode="auto">
           <a:xfrm>
-            <a:off x="1438275" y="18545969"/>
+            <a:off x="1438275" y="19342893"/>
             <a:ext cx="6297612" cy="12876687"/>
           </a:xfrm>
           <a:prstGeom prst="rect">
@@ -10958,7 +11032,11 @@
               </a:lnSpc>
             </a:pPr>
             <a:r>
-              <a:rPr lang="da-DK" altLang="en-DK" sz="3500" dirty="0" err="1"/>
+              <a:rPr lang="da-DK" altLang="en-DK" sz="4500" dirty="0" err="1">
+                <a:solidFill>
+                  <a:srgbClr val="C00000"/>
+                </a:solidFill>
+              </a:rPr>
               <a:t>Introduction</a:t>
             </a:r>
             <a:r>
@@ -11051,7 +11129,7 @@
         <p:spPr bwMode="auto">
           <a:xfrm>
             <a:off x="1438276" y="12111831"/>
-            <a:ext cx="15645928" cy="5649913"/>
+            <a:ext cx="14345572" cy="5649913"/>
           </a:xfrm>
           <a:prstGeom prst="rect">
             <a:avLst/>
@@ -11303,8 +11381,8 @@
         </p:nvSpPr>
         <p:spPr>
           <a:xfrm>
-            <a:off x="9052952" y="25483345"/>
-            <a:ext cx="6707357" cy="7416799"/>
+            <a:off x="16057736" y="12244387"/>
+            <a:ext cx="5919830" cy="7416799"/>
           </a:xfrm>
           <a:noFill/>
           <a:ln/>
@@ -11319,15 +11397,27 @@
               </a:lnSpc>
             </a:pPr>
             <a:r>
-              <a:rPr lang="da-DK" altLang="en-DK" sz="3500" dirty="0"/>
+              <a:rPr lang="da-DK" altLang="en-DK" sz="4500" dirty="0">
+                <a:solidFill>
+                  <a:srgbClr val="C00000"/>
+                </a:solidFill>
+              </a:rPr>
               <a:t>Power </a:t>
             </a:r>
             <a:r>
-              <a:rPr lang="da-DK" altLang="en-DK" sz="3500" dirty="0" err="1"/>
+              <a:rPr lang="da-DK" altLang="en-DK" sz="4500" dirty="0" err="1">
+                <a:solidFill>
+                  <a:srgbClr val="C00000"/>
+                </a:solidFill>
+              </a:rPr>
               <a:t>savings</a:t>
             </a:r>
             <a:r>
-              <a:rPr lang="da-DK" altLang="en-DK" sz="3500" dirty="0"/>
+              <a:rPr lang="da-DK" altLang="en-DK" sz="4500" dirty="0">
+                <a:solidFill>
+                  <a:srgbClr val="C00000"/>
+                </a:solidFill>
+              </a:rPr>
               <a:t>  </a:t>
             </a:r>
           </a:p>
@@ -11636,8 +11726,8 @@
         </p:nvSpPr>
         <p:spPr bwMode="auto">
           <a:xfrm>
-            <a:off x="21722557" y="37927359"/>
-            <a:ext cx="6297612" cy="792163"/>
+            <a:off x="16315272" y="36267509"/>
+            <a:ext cx="12456312" cy="792163"/>
           </a:xfrm>
           <a:prstGeom prst="rect">
             <a:avLst/>
@@ -11736,6 +11826,262 @@
                 </a:solidFill>
               </a:rPr>
               <a:t>code</a:t>
+            </a:r>
+            <a:r>
+              <a:rPr lang="da-DK" altLang="en-DK" sz="1500" dirty="0">
+                <a:solidFill>
+                  <a:srgbClr val="BD2A33"/>
+                </a:solidFill>
+              </a:rPr>
+              <a:t>, the big </a:t>
+            </a:r>
+            <a:r>
+              <a:rPr lang="da-DK" altLang="en-DK" sz="1500" dirty="0" err="1">
+                <a:solidFill>
+                  <a:srgbClr val="BD2A33"/>
+                </a:solidFill>
+              </a:rPr>
+              <a:t>circle</a:t>
+            </a:r>
+            <a:r>
+              <a:rPr lang="da-DK" altLang="en-DK" sz="1500" dirty="0">
+                <a:solidFill>
+                  <a:srgbClr val="BD2A33"/>
+                </a:solidFill>
+              </a:rPr>
+              <a:t> </a:t>
+            </a:r>
+            <a:r>
+              <a:rPr lang="da-DK" altLang="en-DK" sz="1500" dirty="0" err="1">
+                <a:solidFill>
+                  <a:srgbClr val="BD2A33"/>
+                </a:solidFill>
+              </a:rPr>
+              <a:t>represents</a:t>
+            </a:r>
+            <a:r>
+              <a:rPr lang="da-DK" altLang="en-DK" sz="1500" dirty="0">
+                <a:solidFill>
+                  <a:srgbClr val="BD2A33"/>
+                </a:solidFill>
+              </a:rPr>
+              <a:t> the </a:t>
+            </a:r>
+            <a:r>
+              <a:rPr lang="da-DK" altLang="en-DK" sz="1500" dirty="0" err="1">
+                <a:solidFill>
+                  <a:srgbClr val="BD2A33"/>
+                </a:solidFill>
+              </a:rPr>
+              <a:t>code</a:t>
+            </a:r>
+            <a:r>
+              <a:rPr lang="da-DK" altLang="en-DK" sz="1500" dirty="0">
+                <a:solidFill>
+                  <a:srgbClr val="BD2A33"/>
+                </a:solidFill>
+              </a:rPr>
+              <a:t> </a:t>
+            </a:r>
+            <a:r>
+              <a:rPr lang="da-DK" altLang="en-DK" sz="1500" dirty="0" err="1">
+                <a:solidFill>
+                  <a:srgbClr val="BD2A33"/>
+                </a:solidFill>
+              </a:rPr>
+              <a:t>which</a:t>
+            </a:r>
+            <a:r>
+              <a:rPr lang="da-DK" altLang="en-DK" sz="1500" dirty="0">
+                <a:solidFill>
+                  <a:srgbClr val="BD2A33"/>
+                </a:solidFill>
+              </a:rPr>
+              <a:t> is </a:t>
+            </a:r>
+            <a:r>
+              <a:rPr lang="da-DK" altLang="en-DK" sz="1500" dirty="0" err="1">
+                <a:solidFill>
+                  <a:srgbClr val="BD2A33"/>
+                </a:solidFill>
+              </a:rPr>
+              <a:t>continously</a:t>
+            </a:r>
+            <a:r>
+              <a:rPr lang="da-DK" altLang="en-DK" sz="1500" dirty="0">
+                <a:solidFill>
+                  <a:srgbClr val="BD2A33"/>
+                </a:solidFill>
+              </a:rPr>
+              <a:t> running in the </a:t>
+            </a:r>
+            <a:r>
+              <a:rPr lang="da-DK" altLang="en-DK" sz="1500" dirty="0" err="1">
+                <a:solidFill>
+                  <a:srgbClr val="BD2A33"/>
+                </a:solidFill>
+              </a:rPr>
+              <a:t>main</a:t>
+            </a:r>
+            <a:r>
+              <a:rPr lang="da-DK" altLang="en-DK" sz="1500" dirty="0">
+                <a:solidFill>
+                  <a:srgbClr val="BD2A33"/>
+                </a:solidFill>
+              </a:rPr>
+              <a:t> loop, </a:t>
+            </a:r>
+            <a:r>
+              <a:rPr lang="da-DK" altLang="en-DK" sz="1500" dirty="0" err="1">
+                <a:solidFill>
+                  <a:srgbClr val="BD2A33"/>
+                </a:solidFill>
+              </a:rPr>
+              <a:t>while</a:t>
+            </a:r>
+            <a:r>
+              <a:rPr lang="da-DK" altLang="en-DK" sz="1500" dirty="0">
+                <a:solidFill>
+                  <a:srgbClr val="BD2A33"/>
+                </a:solidFill>
+              </a:rPr>
+              <a:t> all the </a:t>
+            </a:r>
+            <a:r>
+              <a:rPr lang="da-DK" altLang="en-DK" sz="1500" dirty="0" err="1">
+                <a:solidFill>
+                  <a:srgbClr val="BD2A33"/>
+                </a:solidFill>
+              </a:rPr>
+              <a:t>boxes</a:t>
+            </a:r>
+            <a:r>
+              <a:rPr lang="da-DK" altLang="en-DK" sz="1500" dirty="0">
+                <a:solidFill>
+                  <a:srgbClr val="BD2A33"/>
+                </a:solidFill>
+              </a:rPr>
+              <a:t> to the right </a:t>
+            </a:r>
+            <a:r>
+              <a:rPr lang="da-DK" altLang="en-DK" sz="1500" dirty="0" err="1">
+                <a:solidFill>
+                  <a:srgbClr val="BD2A33"/>
+                </a:solidFill>
+              </a:rPr>
+              <a:t>represent</a:t>
+            </a:r>
+            <a:r>
+              <a:rPr lang="da-DK" altLang="en-DK" sz="1500" dirty="0">
+                <a:solidFill>
+                  <a:srgbClr val="BD2A33"/>
+                </a:solidFill>
+              </a:rPr>
+              <a:t> the </a:t>
+            </a:r>
+            <a:r>
+              <a:rPr lang="da-DK" altLang="en-DK" sz="1500" dirty="0" err="1">
+                <a:solidFill>
+                  <a:srgbClr val="BD2A33"/>
+                </a:solidFill>
+              </a:rPr>
+              <a:t>various</a:t>
+            </a:r>
+            <a:r>
+              <a:rPr lang="da-DK" altLang="en-DK" sz="1500" dirty="0">
+                <a:solidFill>
+                  <a:srgbClr val="BD2A33"/>
+                </a:solidFill>
+              </a:rPr>
+              <a:t> </a:t>
+            </a:r>
+            <a:r>
+              <a:rPr lang="da-DK" altLang="en-DK" sz="1500" dirty="0" err="1">
+                <a:solidFill>
+                  <a:srgbClr val="BD2A33"/>
+                </a:solidFill>
+              </a:rPr>
+              <a:t>interrupt</a:t>
+            </a:r>
+            <a:r>
+              <a:rPr lang="da-DK" altLang="en-DK" sz="1500" dirty="0">
+                <a:solidFill>
+                  <a:srgbClr val="BD2A33"/>
+                </a:solidFill>
+              </a:rPr>
+              <a:t> service rutines, with the labels on the </a:t>
+            </a:r>
+            <a:r>
+              <a:rPr lang="da-DK" altLang="en-DK" sz="1500" dirty="0" err="1">
+                <a:solidFill>
+                  <a:srgbClr val="BD2A33"/>
+                </a:solidFill>
+              </a:rPr>
+              <a:t>arrows</a:t>
+            </a:r>
+            <a:r>
+              <a:rPr lang="da-DK" altLang="en-DK" sz="1500" dirty="0">
+                <a:solidFill>
+                  <a:srgbClr val="BD2A33"/>
+                </a:solidFill>
+              </a:rPr>
+              <a:t> </a:t>
+            </a:r>
+            <a:r>
+              <a:rPr lang="da-DK" altLang="en-DK" sz="1500" dirty="0" err="1">
+                <a:solidFill>
+                  <a:srgbClr val="BD2A33"/>
+                </a:solidFill>
+              </a:rPr>
+              <a:t>referring</a:t>
+            </a:r>
+            <a:r>
+              <a:rPr lang="da-DK" altLang="en-DK" sz="1500" dirty="0">
+                <a:solidFill>
+                  <a:srgbClr val="BD2A33"/>
+                </a:solidFill>
+              </a:rPr>
+              <a:t> to the </a:t>
+            </a:r>
+            <a:r>
+              <a:rPr lang="da-DK" altLang="en-DK" sz="1500" dirty="0" err="1">
+                <a:solidFill>
+                  <a:srgbClr val="BD2A33"/>
+                </a:solidFill>
+              </a:rPr>
+              <a:t>condition</a:t>
+            </a:r>
+            <a:r>
+              <a:rPr lang="da-DK" altLang="en-DK" sz="1500" dirty="0">
+                <a:solidFill>
+                  <a:srgbClr val="BD2A33"/>
+                </a:solidFill>
+              </a:rPr>
+              <a:t> </a:t>
+            </a:r>
+            <a:r>
+              <a:rPr lang="da-DK" altLang="en-DK" sz="1500" dirty="0" err="1">
+                <a:solidFill>
+                  <a:srgbClr val="BD2A33"/>
+                </a:solidFill>
+              </a:rPr>
+              <a:t>that</a:t>
+            </a:r>
+            <a:r>
+              <a:rPr lang="da-DK" altLang="en-DK" sz="1500" dirty="0">
+                <a:solidFill>
+                  <a:srgbClr val="BD2A33"/>
+                </a:solidFill>
+              </a:rPr>
+              <a:t> triggers the </a:t>
+            </a:r>
+            <a:r>
+              <a:rPr lang="da-DK" altLang="en-DK" sz="1500" dirty="0" err="1">
+                <a:solidFill>
+                  <a:srgbClr val="BD2A33"/>
+                </a:solidFill>
+              </a:rPr>
+              <a:t>interrupt</a:t>
             </a:r>
             <a:endParaRPr lang="da-DK" altLang="en-DK" sz="1500" dirty="0">
               <a:solidFill>
@@ -11761,8 +12107,8 @@
         </p:nvSpPr>
         <p:spPr bwMode="auto">
           <a:xfrm>
-            <a:off x="10082998" y="24270604"/>
-            <a:ext cx="6281753" cy="642879"/>
+            <a:off x="9834800" y="23976712"/>
+            <a:ext cx="4566762" cy="642879"/>
           </a:xfrm>
           <a:prstGeom prst="rect">
             <a:avLst/>
@@ -12149,7 +12495,7 @@
         </p:blipFill>
         <p:spPr>
           <a:xfrm>
-            <a:off x="16384316" y="24054597"/>
+            <a:off x="16257273" y="22364895"/>
             <a:ext cx="12572310" cy="13720601"/>
           </a:xfrm>
           <a:prstGeom prst="rect">
@@ -12222,8 +12568,8 @@
         </p:blipFill>
         <p:spPr bwMode="auto">
           <a:xfrm>
-            <a:off x="8632843" y="33684369"/>
-            <a:ext cx="7467523" cy="3279217"/>
+            <a:off x="8849383" y="34869308"/>
+            <a:ext cx="6421437" cy="2819849"/>
           </a:xfrm>
           <a:prstGeom prst="rect">
             <a:avLst/>
@@ -12256,8 +12602,8 @@
         </p:nvSpPr>
         <p:spPr bwMode="auto">
           <a:xfrm>
-            <a:off x="16638954" y="18348258"/>
-            <a:ext cx="12565918" cy="5549122"/>
+            <a:off x="22275939" y="12111831"/>
+            <a:ext cx="5744230" cy="8304918"/>
           </a:xfrm>
           <a:prstGeom prst="rect">
             <a:avLst/>
@@ -12484,7 +12830,11 @@
               </a:lnSpc>
             </a:pPr>
             <a:r>
-              <a:rPr lang="en-US" altLang="en-DK" sz="3500" dirty="0"/>
+              <a:rPr lang="en-US" altLang="en-DK" sz="4500" dirty="0">
+                <a:solidFill>
+                  <a:srgbClr val="C00000"/>
+                </a:solidFill>
+              </a:rPr>
               <a:t>Code</a:t>
             </a:r>
           </a:p>
@@ -12500,7 +12850,7 @@
                   <a:schemeClr val="tx1"/>
                 </a:solidFill>
               </a:rPr>
-              <a:t>We wrote the code of this project in the Arduino language, with the </a:t>
+              <a:t>We wrote this project in the Arduino language, which is based on C++, with the </a:t>
             </a:r>
             <a:r>
               <a:rPr lang="en-US" altLang="en-DK" sz="3500" b="0" dirty="0" err="1">
@@ -12516,7 +12866,7 @@
                   <a:schemeClr val="tx1"/>
                 </a:solidFill>
               </a:rPr>
-              <a:t> extension necessary for compiling code the Teensy can run. The Arduino language is based on C++.</a:t>
+              <a:t> extension necessary for compiling code the Teensy can run.</a:t>
             </a:r>
             <a:br>
               <a:rPr lang="en-US" altLang="en-DK" sz="3500" b="0" dirty="0">
@@ -12553,6 +12903,419 @@
                 <a:schemeClr val="tx1"/>
               </a:solidFill>
             </a:endParaRPr>
+          </a:p>
+        </p:txBody>
+      </p:sp>
+      <p:sp>
+        <p:nvSpPr>
+          <p:cNvPr id="36" name="Rectangle 6">
+            <a:extLst>
+              <a:ext uri="{FF2B5EF4-FFF2-40B4-BE49-F238E27FC236}">
+                <a16:creationId xmlns:a16="http://schemas.microsoft.com/office/drawing/2014/main" id="{312ECE3C-7188-4951-B97F-83B7A637AE48}"/>
+              </a:ext>
+            </a:extLst>
+          </p:cNvPr>
+          <p:cNvSpPr>
+            <a:spLocks noChangeArrowheads="1"/>
+          </p:cNvSpPr>
+          <p:nvPr/>
+        </p:nvSpPr>
+        <p:spPr bwMode="auto">
+          <a:xfrm>
+            <a:off x="8594867" y="24819199"/>
+            <a:ext cx="7188980" cy="13391005"/>
+          </a:xfrm>
+          <a:prstGeom prst="rect">
+            <a:avLst/>
+          </a:prstGeom>
+          <a:noFill/>
+          <a:ln>
+            <a:noFill/>
+          </a:ln>
+          <a:effectLst/>
+          <a:extLst>
+            <a:ext uri="{909E8E84-426E-40DD-AFC4-6F175D3DCCD1}">
+              <a14:hiddenFill xmlns:a14="http://schemas.microsoft.com/office/drawing/2010/main">
+                <a:solidFill>
+                  <a:schemeClr val="accent1"/>
+                </a:solidFill>
+              </a14:hiddenFill>
+            </a:ext>
+            <a:ext uri="{91240B29-F687-4F45-9708-019B960494DF}">
+              <a14:hiddenLine xmlns:a14="http://schemas.microsoft.com/office/drawing/2010/main" w="9525">
+                <a:solidFill>
+                  <a:schemeClr val="tx1"/>
+                </a:solidFill>
+                <a:miter lim="800000"/>
+                <a:headEnd/>
+                <a:tailEnd/>
+              </a14:hiddenLine>
+            </a:ext>
+            <a:ext uri="{AF507438-7753-43E0-B8FC-AC1667EBCBE1}">
+              <a14:hiddenEffects xmlns:a14="http://schemas.microsoft.com/office/drawing/2010/main">
+                <a:effectLst>
+                  <a:outerShdw dist="35921" dir="2700000" algn="ctr" rotWithShape="0">
+                    <a:schemeClr val="bg2"/>
+                  </a:outerShdw>
+                </a:effectLst>
+              </a14:hiddenEffects>
+            </a:ext>
+          </a:extLst>
+        </p:spPr>
+        <p:txBody>
+          <a:bodyPr lIns="0" tIns="0" rIns="0" bIns="0"/>
+          <a:lstStyle>
+            <a:lvl1pPr>
+              <a:lnSpc>
+                <a:spcPts val="6000"/>
+              </a:lnSpc>
+              <a:defRPr sz="4400" b="1">
+                <a:solidFill>
+                  <a:schemeClr val="bg2"/>
+                </a:solidFill>
+                <a:latin typeface="Arial" panose="020B0604020202020204" pitchFamily="34" charset="0"/>
+                <a:cs typeface="Arial" panose="020B0604020202020204" pitchFamily="34" charset="0"/>
+              </a:defRPr>
+            </a:lvl1pPr>
+            <a:lvl2pPr marL="1588">
+              <a:lnSpc>
+                <a:spcPts val="4500"/>
+              </a:lnSpc>
+              <a:defRPr sz="3100">
+                <a:solidFill>
+                  <a:schemeClr val="bg2"/>
+                </a:solidFill>
+                <a:latin typeface="Arial" panose="020B0604020202020204" pitchFamily="34" charset="0"/>
+                <a:cs typeface="Arial" panose="020B0604020202020204" pitchFamily="34" charset="0"/>
+              </a:defRPr>
+            </a:lvl2pPr>
+            <a:lvl3pPr marL="647700" indent="-644525">
+              <a:lnSpc>
+                <a:spcPts val="4500"/>
+              </a:lnSpc>
+              <a:buFont typeface="Wingdings" panose="05000000000000000000" pitchFamily="2" charset="2"/>
+              <a:buChar char=""/>
+              <a:defRPr sz="3100">
+                <a:solidFill>
+                  <a:schemeClr val="bg2"/>
+                </a:solidFill>
+                <a:latin typeface="Arial" panose="020B0604020202020204" pitchFamily="34" charset="0"/>
+                <a:cs typeface="Arial" panose="020B0604020202020204" pitchFamily="34" charset="0"/>
+              </a:defRPr>
+            </a:lvl3pPr>
+            <a:lvl4pPr marL="1333500" indent="-609600">
+              <a:lnSpc>
+                <a:spcPts val="4500"/>
+              </a:lnSpc>
+              <a:buFont typeface="Wingdings" panose="05000000000000000000" pitchFamily="2" charset="2"/>
+              <a:buChar char=""/>
+              <a:defRPr sz="3100">
+                <a:solidFill>
+                  <a:schemeClr val="bg2"/>
+                </a:solidFill>
+                <a:latin typeface="Arial" panose="020B0604020202020204" pitchFamily="34" charset="0"/>
+                <a:cs typeface="Arial" panose="020B0604020202020204" pitchFamily="34" charset="0"/>
+              </a:defRPr>
+            </a:lvl4pPr>
+            <a:lvl5pPr marL="2057400" indent="-609600">
+              <a:lnSpc>
+                <a:spcPts val="4500"/>
+              </a:lnSpc>
+              <a:buFont typeface="Wingdings" panose="05000000000000000000" pitchFamily="2" charset="2"/>
+              <a:buChar char=""/>
+              <a:defRPr sz="3100">
+                <a:solidFill>
+                  <a:schemeClr val="bg2"/>
+                </a:solidFill>
+                <a:latin typeface="Arial" panose="020B0604020202020204" pitchFamily="34" charset="0"/>
+                <a:cs typeface="Arial" panose="020B0604020202020204" pitchFamily="34" charset="0"/>
+              </a:defRPr>
+            </a:lvl5pPr>
+            <a:lvl6pPr marL="2514600" indent="-609600" fontAlgn="base">
+              <a:lnSpc>
+                <a:spcPts val="4500"/>
+              </a:lnSpc>
+              <a:spcBef>
+                <a:spcPct val="0"/>
+              </a:spcBef>
+              <a:spcAft>
+                <a:spcPct val="0"/>
+              </a:spcAft>
+              <a:buFont typeface="Wingdings" panose="05000000000000000000" pitchFamily="2" charset="2"/>
+              <a:buChar char=""/>
+              <a:defRPr sz="3100">
+                <a:solidFill>
+                  <a:schemeClr val="bg2"/>
+                </a:solidFill>
+                <a:latin typeface="Arial" panose="020B0604020202020204" pitchFamily="34" charset="0"/>
+                <a:cs typeface="Arial" panose="020B0604020202020204" pitchFamily="34" charset="0"/>
+              </a:defRPr>
+            </a:lvl6pPr>
+            <a:lvl7pPr marL="2971800" indent="-609600" fontAlgn="base">
+              <a:lnSpc>
+                <a:spcPts val="4500"/>
+              </a:lnSpc>
+              <a:spcBef>
+                <a:spcPct val="0"/>
+              </a:spcBef>
+              <a:spcAft>
+                <a:spcPct val="0"/>
+              </a:spcAft>
+              <a:buFont typeface="Wingdings" panose="05000000000000000000" pitchFamily="2" charset="2"/>
+              <a:buChar char=""/>
+              <a:defRPr sz="3100">
+                <a:solidFill>
+                  <a:schemeClr val="bg2"/>
+                </a:solidFill>
+                <a:latin typeface="Arial" panose="020B0604020202020204" pitchFamily="34" charset="0"/>
+                <a:cs typeface="Arial" panose="020B0604020202020204" pitchFamily="34" charset="0"/>
+              </a:defRPr>
+            </a:lvl7pPr>
+            <a:lvl8pPr marL="3429000" indent="-609600" fontAlgn="base">
+              <a:lnSpc>
+                <a:spcPts val="4500"/>
+              </a:lnSpc>
+              <a:spcBef>
+                <a:spcPct val="0"/>
+              </a:spcBef>
+              <a:spcAft>
+                <a:spcPct val="0"/>
+              </a:spcAft>
+              <a:buFont typeface="Wingdings" panose="05000000000000000000" pitchFamily="2" charset="2"/>
+              <a:buChar char=""/>
+              <a:defRPr sz="3100">
+                <a:solidFill>
+                  <a:schemeClr val="bg2"/>
+                </a:solidFill>
+                <a:latin typeface="Arial" panose="020B0604020202020204" pitchFamily="34" charset="0"/>
+                <a:cs typeface="Arial" panose="020B0604020202020204" pitchFamily="34" charset="0"/>
+              </a:defRPr>
+            </a:lvl8pPr>
+            <a:lvl9pPr marL="3886200" indent="-609600" fontAlgn="base">
+              <a:lnSpc>
+                <a:spcPts val="4500"/>
+              </a:lnSpc>
+              <a:spcBef>
+                <a:spcPct val="0"/>
+              </a:spcBef>
+              <a:spcAft>
+                <a:spcPct val="0"/>
+              </a:spcAft>
+              <a:buFont typeface="Wingdings" panose="05000000000000000000" pitchFamily="2" charset="2"/>
+              <a:buChar char=""/>
+              <a:defRPr sz="3100">
+                <a:solidFill>
+                  <a:schemeClr val="bg2"/>
+                </a:solidFill>
+                <a:latin typeface="Arial" panose="020B0604020202020204" pitchFamily="34" charset="0"/>
+                <a:cs typeface="Arial" panose="020B0604020202020204" pitchFamily="34" charset="0"/>
+              </a:defRPr>
+            </a:lvl9pPr>
+          </a:lstStyle>
+          <a:p>
+            <a:pPr>
+              <a:lnSpc>
+                <a:spcPts val="4500"/>
+              </a:lnSpc>
+            </a:pPr>
+            <a:r>
+              <a:rPr lang="da-DK" altLang="en-DK" sz="4500" dirty="0" err="1">
+                <a:solidFill>
+                  <a:srgbClr val="C00000"/>
+                </a:solidFill>
+              </a:rPr>
+              <a:t>Specifications</a:t>
+            </a:r>
+            <a:r>
+              <a:rPr lang="da-DK" altLang="en-DK" sz="3500" dirty="0"/>
+              <a:t> </a:t>
+            </a:r>
+            <a:endParaRPr lang="da-DK" altLang="en-DK" sz="3500" b="0" dirty="0">
+              <a:solidFill>
+                <a:schemeClr val="tx1"/>
+              </a:solidFill>
+            </a:endParaRPr>
+          </a:p>
+          <a:p>
+            <a:pPr>
+              <a:lnSpc>
+                <a:spcPts val="4500"/>
+              </a:lnSpc>
+            </a:pPr>
+            <a:r>
+              <a:rPr lang="en-US" altLang="en-DK" sz="3500" b="0" dirty="0">
+                <a:solidFill>
+                  <a:schemeClr val="tx1"/>
+                </a:solidFill>
+              </a:rPr>
+              <a:t>In order to replace the RIO, we had to implement the following features:</a:t>
+            </a:r>
+          </a:p>
+          <a:p>
+            <a:pPr marL="457200" indent="-457200">
+              <a:lnSpc>
+                <a:spcPts val="4500"/>
+              </a:lnSpc>
+              <a:buFont typeface="Arial" panose="020B0604020202020204" pitchFamily="34" charset="0"/>
+              <a:buChar char="•"/>
+            </a:pPr>
+            <a:r>
+              <a:rPr lang="en-US" altLang="en-DK" sz="3500" b="0" dirty="0">
+                <a:solidFill>
+                  <a:schemeClr val="tx1"/>
+                </a:solidFill>
+              </a:rPr>
+              <a:t>Calculating ignition and injection timing</a:t>
+            </a:r>
+          </a:p>
+          <a:p>
+            <a:pPr marL="457200" indent="-457200">
+              <a:lnSpc>
+                <a:spcPts val="4500"/>
+              </a:lnSpc>
+              <a:buFont typeface="Arial" panose="020B0604020202020204" pitchFamily="34" charset="0"/>
+              <a:buChar char="•"/>
+            </a:pPr>
+            <a:r>
+              <a:rPr lang="en-US" altLang="en-DK" sz="3500" b="0" dirty="0">
+                <a:solidFill>
+                  <a:schemeClr val="tx1"/>
+                </a:solidFill>
+              </a:rPr>
+              <a:t>Control starter motor until engine is idle</a:t>
+            </a:r>
+          </a:p>
+          <a:p>
+            <a:pPr marL="457200" indent="-457200">
+              <a:lnSpc>
+                <a:spcPts val="4500"/>
+              </a:lnSpc>
+              <a:buFont typeface="Arial" panose="020B0604020202020204" pitchFamily="34" charset="0"/>
+              <a:buChar char="•"/>
+            </a:pPr>
+            <a:r>
+              <a:rPr lang="en-US" altLang="en-DK" sz="3500" b="0" dirty="0">
+                <a:solidFill>
+                  <a:schemeClr val="tx1"/>
+                </a:solidFill>
+              </a:rPr>
+              <a:t>Control gear</a:t>
+            </a:r>
+          </a:p>
+          <a:p>
+            <a:pPr marL="457200" indent="-457200">
+              <a:lnSpc>
+                <a:spcPts val="4500"/>
+              </a:lnSpc>
+              <a:buFont typeface="Arial" panose="020B0604020202020204" pitchFamily="34" charset="0"/>
+              <a:buChar char="•"/>
+            </a:pPr>
+            <a:r>
+              <a:rPr lang="en-US" altLang="en-DK" sz="3500" b="0" dirty="0">
+                <a:solidFill>
+                  <a:schemeClr val="tx1"/>
+                </a:solidFill>
+              </a:rPr>
+              <a:t>Monitor and calculate values such as speed and temperature</a:t>
+            </a:r>
+          </a:p>
+          <a:p>
+            <a:pPr marL="457200" indent="-457200">
+              <a:lnSpc>
+                <a:spcPts val="4500"/>
+              </a:lnSpc>
+              <a:buFont typeface="Arial" panose="020B0604020202020204" pitchFamily="34" charset="0"/>
+              <a:buChar char="•"/>
+            </a:pPr>
+            <a:r>
+              <a:rPr lang="en-US" altLang="en-DK" sz="3500" b="0" dirty="0">
+                <a:solidFill>
+                  <a:schemeClr val="tx1"/>
+                </a:solidFill>
+              </a:rPr>
+              <a:t>Communicate over </a:t>
+            </a:r>
+            <a:r>
+              <a:rPr lang="en-US" altLang="en-DK" sz="3500" b="0" dirty="0" err="1">
+                <a:solidFill>
+                  <a:schemeClr val="tx1"/>
+                </a:solidFill>
+              </a:rPr>
+              <a:t>CANbus</a:t>
+            </a:r>
+            <a:endParaRPr lang="en-US" altLang="en-DK" sz="3500" b="0" dirty="0">
+              <a:solidFill>
+                <a:schemeClr val="tx1"/>
+              </a:solidFill>
+            </a:endParaRPr>
+          </a:p>
+          <a:p>
+            <a:pPr marL="457200" indent="-457200">
+              <a:lnSpc>
+                <a:spcPts val="4500"/>
+              </a:lnSpc>
+              <a:buFont typeface="Arial" panose="020B0604020202020204" pitchFamily="34" charset="0"/>
+              <a:buChar char="•"/>
+            </a:pPr>
+            <a:r>
+              <a:rPr lang="en-US" altLang="en-DK" sz="3500" b="0" dirty="0">
+                <a:solidFill>
+                  <a:schemeClr val="tx1"/>
+                </a:solidFill>
+              </a:rPr>
+              <a:t>Communicate with a computer through USB</a:t>
+            </a:r>
+          </a:p>
+          <a:p>
+            <a:pPr marL="457200" indent="-457200">
+              <a:lnSpc>
+                <a:spcPts val="4500"/>
+              </a:lnSpc>
+              <a:buFont typeface="Arial" panose="020B0604020202020204" pitchFamily="34" charset="0"/>
+              <a:buChar char="•"/>
+            </a:pPr>
+            <a:r>
+              <a:rPr lang="en-US" altLang="en-DK" sz="3500" b="0" dirty="0">
+                <a:solidFill>
+                  <a:schemeClr val="tx1"/>
+                </a:solidFill>
+              </a:rPr>
+              <a:t>Log data on SD card</a:t>
+            </a:r>
+          </a:p>
+          <a:p>
+            <a:pPr marL="457200" indent="-457200">
+              <a:lnSpc>
+                <a:spcPts val="4500"/>
+              </a:lnSpc>
+              <a:buFont typeface="Arial" panose="020B0604020202020204" pitchFamily="34" charset="0"/>
+              <a:buChar char="•"/>
+            </a:pPr>
+            <a:r>
+              <a:rPr lang="en-US" altLang="en-DK" sz="3500" b="0" dirty="0">
+                <a:solidFill>
+                  <a:schemeClr val="tx1"/>
+                </a:solidFill>
+              </a:rPr>
+              <a:t>Have an emergency stop</a:t>
+            </a:r>
+          </a:p>
+          <a:p>
+            <a:pPr marL="457200" indent="-457200">
+              <a:lnSpc>
+                <a:spcPts val="4500"/>
+              </a:lnSpc>
+              <a:buFont typeface="Arial" panose="020B0604020202020204" pitchFamily="34" charset="0"/>
+              <a:buChar char="•"/>
+            </a:pPr>
+            <a:r>
+              <a:rPr lang="en-US" altLang="en-DK" sz="3500" b="0" dirty="0">
+                <a:solidFill>
+                  <a:schemeClr val="tx1"/>
+                </a:solidFill>
+              </a:rPr>
+              <a:t>Only drive when a continuous signal is received from the driver</a:t>
+            </a:r>
           </a:p>
         </p:txBody>
       </p:sp>

</xml_diff>

<commit_message>
Nu med svg kode oversigt
</commit_message>
<xml_diff>
--- a/Poster.pptx
+++ b/Poster.pptx
@@ -10344,8 +10344,8 @@
         </p:nvSpPr>
         <p:spPr bwMode="auto">
           <a:xfrm>
-            <a:off x="738188" y="4198938"/>
-            <a:ext cx="28827412" cy="34728150"/>
+            <a:off x="738188" y="4318072"/>
+            <a:ext cx="28827412" cy="34609016"/>
           </a:xfrm>
           <a:prstGeom prst="rect">
             <a:avLst/>
@@ -10835,7 +10835,7 @@
         </p:nvSpPr>
         <p:spPr bwMode="auto">
           <a:xfrm>
-            <a:off x="1438275" y="19342893"/>
+            <a:off x="1457504" y="18737295"/>
             <a:ext cx="6297612" cy="12876687"/>
           </a:xfrm>
           <a:prstGeom prst="rect">
@@ -11361,7 +11361,7 @@
             </a:r>
             <a:r>
               <a:rPr lang="en-US" altLang="en-DK" sz="3600" dirty="0"/>
-              <a:t> power consumption was to replace the current, power inefficient motor control with our own embedded electronics, using only one microcontroller, and removing no functionalities of the car. This resulted in our ECU, which uses less power while having the same functionality as the old motor control.</a:t>
+              <a:t> power consumption was to replace the current, power inefficient motor control with our own embedded electronics, using only one microcontroller, and removing no functionalities of the car. This resulted in our engine control unit (ECU), which uses less power while having the same functionality as the old motor control.</a:t>
             </a:r>
             <a:endParaRPr lang="da-DK" altLang="en-DK" sz="3600" dirty="0">
               <a:solidFill>
@@ -11389,8 +11389,8 @@
         </p:nvSpPr>
         <p:spPr>
           <a:xfrm>
-            <a:off x="16229050" y="11748439"/>
-            <a:ext cx="5919830" cy="7416799"/>
+            <a:off x="16315272" y="11748438"/>
+            <a:ext cx="6414125" cy="9151768"/>
           </a:xfrm>
           <a:noFill/>
           <a:ln/>
@@ -12115,7 +12115,7 @@
         </p:nvSpPr>
         <p:spPr bwMode="auto">
           <a:xfrm>
-            <a:off x="9834799" y="24139318"/>
+            <a:off x="9905976" y="24366477"/>
             <a:ext cx="4566762" cy="642879"/>
           </a:xfrm>
           <a:prstGeom prst="rect">
@@ -12289,42 +12289,6 @@
       </p:pic>
       <p:pic>
         <p:nvPicPr>
-          <p:cNvPr id="33" name="Billede 32">
-            <a:extLst>
-              <a:ext uri="{FF2B5EF4-FFF2-40B4-BE49-F238E27FC236}">
-                <a16:creationId xmlns:a16="http://schemas.microsoft.com/office/drawing/2014/main" id="{07AF57AF-EE67-4F48-8D25-25EC9A481410}"/>
-              </a:ext>
-            </a:extLst>
-          </p:cNvPr>
-          <p:cNvPicPr>
-            <a:picLocks noChangeAspect="1"/>
-          </p:cNvPicPr>
-          <p:nvPr/>
-        </p:nvPicPr>
-        <p:blipFill>
-          <a:blip r:embed="rId5">
-            <a:extLst>
-              <a:ext uri="{28A0092B-C50C-407E-A947-70E740481C1C}">
-                <a14:useLocalDpi xmlns:a14="http://schemas.microsoft.com/office/drawing/2010/main" val="0"/>
-              </a:ext>
-            </a:extLst>
-          </a:blip>
-          <a:stretch>
-            <a:fillRect/>
-          </a:stretch>
-        </p:blipFill>
-        <p:spPr>
-          <a:xfrm>
-            <a:off x="8594867" y="18646300"/>
-            <a:ext cx="7188981" cy="5391735"/>
-          </a:xfrm>
-          <a:prstGeom prst="rect">
-            <a:avLst/>
-          </a:prstGeom>
-        </p:spPr>
-      </p:pic>
-      <p:pic>
-        <p:nvPicPr>
           <p:cNvPr id="1030" name="Picture 6" descr="logo">
             <a:extLst>
               <a:ext uri="{FF2B5EF4-FFF2-40B4-BE49-F238E27FC236}">
@@ -12338,7 +12302,7 @@
           <p:nvPr/>
         </p:nvPicPr>
         <p:blipFill>
-          <a:blip r:embed="rId6">
+          <a:blip r:embed="rId5">
             <a:extLst>
               <a:ext uri="{28A0092B-C50C-407E-A947-70E740481C1C}">
                 <a14:useLocalDpi xmlns:a14="http://schemas.microsoft.com/office/drawing/2010/main" val="0"/>
@@ -12386,8 +12350,8 @@
         </p:nvSpPr>
         <p:spPr bwMode="auto">
           <a:xfrm>
-            <a:off x="22191347" y="11751504"/>
-            <a:ext cx="5744230" cy="8304918"/>
+            <a:off x="22971836" y="11674525"/>
+            <a:ext cx="5849671" cy="8304918"/>
           </a:xfrm>
           <a:prstGeom prst="rect">
             <a:avLst/>
@@ -13163,6 +13127,1917 @@
           </a:extLst>
         </p:spPr>
       </p:pic>
+      <p:pic>
+        <p:nvPicPr>
+          <p:cNvPr id="16" name="Grafik 15">
+            <a:extLst>
+              <a:ext uri="{FF2B5EF4-FFF2-40B4-BE49-F238E27FC236}">
+                <a16:creationId xmlns:a16="http://schemas.microsoft.com/office/drawing/2014/main" id="{67CE0369-5608-4705-B6DF-5087445A6F3A}"/>
+              </a:ext>
+            </a:extLst>
+          </p:cNvPr>
+          <p:cNvPicPr>
+            <a:picLocks noChangeAspect="1"/>
+          </p:cNvPicPr>
+          <p:nvPr/>
+        </p:nvPicPr>
+        <p:blipFill>
+          <a:blip r:embed="rId6">
+            <a:extLst>
+              <a:ext uri="{28A0092B-C50C-407E-A947-70E740481C1C}">
+                <a14:useLocalDpi xmlns:a14="http://schemas.microsoft.com/office/drawing/2010/main" val="0"/>
+              </a:ext>
+              <a:ext uri="{96DAC541-7B7A-43D3-8B79-37D633B846F1}">
+                <asvg:svgBlip xmlns:asvg="http://schemas.microsoft.com/office/drawing/2016/SVG/main" r:embed="rId7"/>
+              </a:ext>
+            </a:extLst>
+          </a:blip>
+          <a:stretch>
+            <a:fillRect/>
+          </a:stretch>
+        </p:blipFill>
+        <p:spPr>
+          <a:xfrm>
+            <a:off x="8402353" y="18584689"/>
+            <a:ext cx="7574008" cy="5680506"/>
+          </a:xfrm>
+          <a:prstGeom prst="rect">
+            <a:avLst/>
+          </a:prstGeom>
+        </p:spPr>
+      </p:pic>
+      <p:pic>
+        <p:nvPicPr>
+          <p:cNvPr id="18" name="Grafik 17">
+            <a:extLst>
+              <a:ext uri="{FF2B5EF4-FFF2-40B4-BE49-F238E27FC236}">
+                <a16:creationId xmlns:a16="http://schemas.microsoft.com/office/drawing/2014/main" id="{369C8C69-E7A4-43E5-8B6B-68FE6CFDB2FF}"/>
+              </a:ext>
+            </a:extLst>
+          </p:cNvPr>
+          <p:cNvPicPr>
+            <a:picLocks noChangeAspect="1"/>
+          </p:cNvPicPr>
+          <p:nvPr/>
+        </p:nvPicPr>
+        <p:blipFill>
+          <a:blip r:embed="rId8">
+            <a:extLst>
+              <a:ext uri="{28A0092B-C50C-407E-A947-70E740481C1C}">
+                <a14:useLocalDpi xmlns:a14="http://schemas.microsoft.com/office/drawing/2010/main" val="0"/>
+              </a:ext>
+              <a:ext uri="{96DAC541-7B7A-43D3-8B79-37D633B846F1}">
+                <asvg:svgBlip xmlns:asvg="http://schemas.microsoft.com/office/drawing/2016/SVG/main" r:embed="rId9"/>
+              </a:ext>
+            </a:extLst>
+          </a:blip>
+          <a:stretch>
+            <a:fillRect/>
+          </a:stretch>
+        </p:blipFill>
+        <p:spPr>
+          <a:xfrm>
+            <a:off x="16315272" y="21270619"/>
+            <a:ext cx="12821220" cy="14076127"/>
+          </a:xfrm>
+          <a:prstGeom prst="rect">
+            <a:avLst/>
+          </a:prstGeom>
+        </p:spPr>
+      </p:pic>
+      <p:sp>
+        <p:nvSpPr>
+          <p:cNvPr id="19" name="Tekstfelt 18">
+            <a:extLst>
+              <a:ext uri="{FF2B5EF4-FFF2-40B4-BE49-F238E27FC236}">
+                <a16:creationId xmlns:a16="http://schemas.microsoft.com/office/drawing/2014/main" id="{6FC76286-BE96-492C-91B3-FCF62A186892}"/>
+              </a:ext>
+            </a:extLst>
+          </p:cNvPr>
+          <p:cNvSpPr txBox="1"/>
+          <p:nvPr/>
+        </p:nvSpPr>
+        <p:spPr>
+          <a:xfrm>
+            <a:off x="17948299" y="21539760"/>
+            <a:ext cx="1080120" cy="369332"/>
+          </a:xfrm>
+          <a:prstGeom prst="rect">
+            <a:avLst/>
+          </a:prstGeom>
+          <a:noFill/>
+        </p:spPr>
+        <p:txBody>
+          <a:bodyPr wrap="square" rtlCol="0">
+            <a:spAutoFit/>
+          </a:bodyPr>
+          <a:lstStyle/>
+          <a:p>
+            <a:r>
+              <a:rPr lang="en-US" dirty="0"/>
+              <a:t>Initialize</a:t>
+            </a:r>
+            <a:endParaRPr lang="da-DK" dirty="0"/>
+          </a:p>
+        </p:txBody>
+      </p:sp>
+      <p:sp>
+        <p:nvSpPr>
+          <p:cNvPr id="48" name="Tekstfelt 47">
+            <a:extLst>
+              <a:ext uri="{FF2B5EF4-FFF2-40B4-BE49-F238E27FC236}">
+                <a16:creationId xmlns:a16="http://schemas.microsoft.com/office/drawing/2014/main" id="{523E5BAB-5D75-4416-B257-854A8A6A29B3}"/>
+              </a:ext>
+            </a:extLst>
+          </p:cNvPr>
+          <p:cNvSpPr txBox="1"/>
+          <p:nvPr/>
+        </p:nvSpPr>
+        <p:spPr>
+          <a:xfrm>
+            <a:off x="16738775" y="22914460"/>
+            <a:ext cx="1353540" cy="369332"/>
+          </a:xfrm>
+          <a:prstGeom prst="rect">
+            <a:avLst/>
+          </a:prstGeom>
+          <a:noFill/>
+        </p:spPr>
+        <p:txBody>
+          <a:bodyPr wrap="square" rtlCol="0">
+            <a:spAutoFit/>
+          </a:bodyPr>
+          <a:lstStyle/>
+          <a:p>
+            <a:r>
+              <a:rPr lang="en-US" b="1" dirty="0"/>
+              <a:t>Main loop</a:t>
+            </a:r>
+            <a:endParaRPr lang="da-DK" b="1" dirty="0"/>
+          </a:p>
+        </p:txBody>
+      </p:sp>
+      <p:sp>
+        <p:nvSpPr>
+          <p:cNvPr id="49" name="Tekstfelt 48">
+            <a:extLst>
+              <a:ext uri="{FF2B5EF4-FFF2-40B4-BE49-F238E27FC236}">
+                <a16:creationId xmlns:a16="http://schemas.microsoft.com/office/drawing/2014/main" id="{8E3A7DC4-870D-44D0-AF70-AF80DBB16751}"/>
+              </a:ext>
+            </a:extLst>
+          </p:cNvPr>
+          <p:cNvSpPr txBox="1"/>
+          <p:nvPr/>
+        </p:nvSpPr>
+        <p:spPr>
+          <a:xfrm>
+            <a:off x="19554427" y="21270548"/>
+            <a:ext cx="2138287" cy="923330"/>
+          </a:xfrm>
+          <a:prstGeom prst="rect">
+            <a:avLst/>
+          </a:prstGeom>
+          <a:noFill/>
+        </p:spPr>
+        <p:txBody>
+          <a:bodyPr wrap="square" rtlCol="0">
+            <a:spAutoFit/>
+          </a:bodyPr>
+          <a:lstStyle/>
+          <a:p>
+            <a:r>
+              <a:rPr lang="en-US" b="1" dirty="0"/>
+              <a:t>Color code</a:t>
+            </a:r>
+          </a:p>
+          <a:p>
+            <a:r>
+              <a:rPr lang="en-US" dirty="0">
+                <a:solidFill>
+                  <a:srgbClr val="FF0000"/>
+                </a:solidFill>
+              </a:rPr>
+              <a:t>Red = legacy code</a:t>
+            </a:r>
+          </a:p>
+          <a:p>
+            <a:r>
+              <a:rPr lang="en-US" dirty="0"/>
+              <a:t>Black = our code</a:t>
+            </a:r>
+            <a:endParaRPr lang="da-DK" dirty="0"/>
+          </a:p>
+        </p:txBody>
+      </p:sp>
+      <p:sp>
+        <p:nvSpPr>
+          <p:cNvPr id="50" name="Tekstfelt 49">
+            <a:extLst>
+              <a:ext uri="{FF2B5EF4-FFF2-40B4-BE49-F238E27FC236}">
+                <a16:creationId xmlns:a16="http://schemas.microsoft.com/office/drawing/2014/main" id="{89725B5C-8519-42C5-BED8-51DA2A814E98}"/>
+              </a:ext>
+            </a:extLst>
+          </p:cNvPr>
+          <p:cNvSpPr txBox="1"/>
+          <p:nvPr/>
+        </p:nvSpPr>
+        <p:spPr>
+          <a:xfrm>
+            <a:off x="17552815" y="23940114"/>
+            <a:ext cx="2001612" cy="646331"/>
+          </a:xfrm>
+          <a:prstGeom prst="rect">
+            <a:avLst/>
+          </a:prstGeom>
+          <a:noFill/>
+        </p:spPr>
+        <p:txBody>
+          <a:bodyPr wrap="square" rtlCol="0">
+            <a:spAutoFit/>
+          </a:bodyPr>
+          <a:lstStyle/>
+          <a:p>
+            <a:pPr algn="ctr"/>
+            <a:r>
+              <a:rPr lang="en-US" dirty="0"/>
+              <a:t>Has emergency stop been pulled</a:t>
+            </a:r>
+            <a:endParaRPr lang="da-DK" dirty="0"/>
+          </a:p>
+        </p:txBody>
+      </p:sp>
+      <p:sp>
+        <p:nvSpPr>
+          <p:cNvPr id="51" name="Tekstfelt 50">
+            <a:extLst>
+              <a:ext uri="{FF2B5EF4-FFF2-40B4-BE49-F238E27FC236}">
+                <a16:creationId xmlns:a16="http://schemas.microsoft.com/office/drawing/2014/main" id="{DA5EBF82-4458-4452-BA0F-D2954D27FD31}"/>
+              </a:ext>
+            </a:extLst>
+          </p:cNvPr>
+          <p:cNvSpPr txBox="1"/>
+          <p:nvPr/>
+        </p:nvSpPr>
+        <p:spPr>
+          <a:xfrm>
+            <a:off x="20263530" y="23890513"/>
+            <a:ext cx="720080" cy="369332"/>
+          </a:xfrm>
+          <a:prstGeom prst="rect">
+            <a:avLst/>
+          </a:prstGeom>
+          <a:noFill/>
+        </p:spPr>
+        <p:txBody>
+          <a:bodyPr wrap="square" rtlCol="0">
+            <a:spAutoFit/>
+          </a:bodyPr>
+          <a:lstStyle/>
+          <a:p>
+            <a:pPr algn="ctr"/>
+            <a:r>
+              <a:rPr lang="en-US" dirty="0"/>
+              <a:t>Yes</a:t>
+            </a:r>
+            <a:endParaRPr lang="da-DK" dirty="0"/>
+          </a:p>
+        </p:txBody>
+      </p:sp>
+      <p:sp>
+        <p:nvSpPr>
+          <p:cNvPr id="52" name="Tekstfelt 51">
+            <a:extLst>
+              <a:ext uri="{FF2B5EF4-FFF2-40B4-BE49-F238E27FC236}">
+                <a16:creationId xmlns:a16="http://schemas.microsoft.com/office/drawing/2014/main" id="{6E143019-CCD3-4CEF-9EA7-13A268184B99}"/>
+              </a:ext>
+            </a:extLst>
+          </p:cNvPr>
+          <p:cNvSpPr txBox="1"/>
+          <p:nvPr/>
+        </p:nvSpPr>
+        <p:spPr>
+          <a:xfrm>
+            <a:off x="20396571" y="24687916"/>
+            <a:ext cx="1584176" cy="923330"/>
+          </a:xfrm>
+          <a:prstGeom prst="rect">
+            <a:avLst/>
+          </a:prstGeom>
+          <a:noFill/>
+        </p:spPr>
+        <p:txBody>
+          <a:bodyPr wrap="square" rtlCol="0">
+            <a:spAutoFit/>
+          </a:bodyPr>
+          <a:lstStyle/>
+          <a:p>
+            <a:pPr algn="ctr"/>
+            <a:r>
+              <a:rPr lang="en-US" dirty="0"/>
+              <a:t>Emergency</a:t>
+            </a:r>
+            <a:br>
+              <a:rPr lang="en-US" dirty="0"/>
+            </a:br>
+            <a:r>
+              <a:rPr lang="en-US" dirty="0"/>
+              <a:t>Stop</a:t>
+            </a:r>
+            <a:br>
+              <a:rPr lang="en-US" dirty="0"/>
+            </a:br>
+            <a:r>
+              <a:rPr lang="en-US" dirty="0"/>
+              <a:t>Procedure</a:t>
+            </a:r>
+            <a:endParaRPr lang="da-DK" dirty="0"/>
+          </a:p>
+        </p:txBody>
+      </p:sp>
+      <p:sp>
+        <p:nvSpPr>
+          <p:cNvPr id="53" name="Tekstfelt 52">
+            <a:extLst>
+              <a:ext uri="{FF2B5EF4-FFF2-40B4-BE49-F238E27FC236}">
+                <a16:creationId xmlns:a16="http://schemas.microsoft.com/office/drawing/2014/main" id="{1290D1D9-98D8-42FB-B9C3-0ED07E481476}"/>
+              </a:ext>
+            </a:extLst>
+          </p:cNvPr>
+          <p:cNvSpPr txBox="1"/>
+          <p:nvPr/>
+        </p:nvSpPr>
+        <p:spPr>
+          <a:xfrm>
+            <a:off x="22417312" y="22582956"/>
+            <a:ext cx="2110760" cy="369332"/>
+          </a:xfrm>
+          <a:prstGeom prst="rect">
+            <a:avLst/>
+          </a:prstGeom>
+          <a:noFill/>
+        </p:spPr>
+        <p:txBody>
+          <a:bodyPr wrap="square" rtlCol="0">
+            <a:spAutoFit/>
+          </a:bodyPr>
+          <a:lstStyle/>
+          <a:p>
+            <a:pPr algn="ctr"/>
+            <a:r>
+              <a:rPr lang="en-US" dirty="0"/>
+              <a:t>1ms has passed</a:t>
+            </a:r>
+            <a:endParaRPr lang="da-DK" dirty="0"/>
+          </a:p>
+        </p:txBody>
+      </p:sp>
+      <p:sp>
+        <p:nvSpPr>
+          <p:cNvPr id="54" name="Tekstfelt 53">
+            <a:extLst>
+              <a:ext uri="{FF2B5EF4-FFF2-40B4-BE49-F238E27FC236}">
+                <a16:creationId xmlns:a16="http://schemas.microsoft.com/office/drawing/2014/main" id="{FB25A9C8-0B74-4BF0-97D7-35073297EF82}"/>
+              </a:ext>
+            </a:extLst>
+          </p:cNvPr>
+          <p:cNvSpPr txBox="1"/>
+          <p:nvPr/>
+        </p:nvSpPr>
+        <p:spPr>
+          <a:xfrm>
+            <a:off x="25054081" y="22616347"/>
+            <a:ext cx="3462441" cy="1631216"/>
+          </a:xfrm>
+          <a:prstGeom prst="rect">
+            <a:avLst/>
+          </a:prstGeom>
+          <a:noFill/>
+        </p:spPr>
+        <p:txBody>
+          <a:bodyPr wrap="square" rtlCol="0">
+            <a:spAutoFit/>
+          </a:bodyPr>
+          <a:lstStyle/>
+          <a:p>
+            <a:pPr algn="ctr"/>
+            <a:r>
+              <a:rPr lang="en-US" sz="2000" dirty="0"/>
+              <a:t>- Calculate start and stop</a:t>
+            </a:r>
+            <a:r>
+              <a:rPr lang="da-DK" sz="2000" dirty="0"/>
+              <a:t> angle</a:t>
+            </a:r>
+            <a:r>
+              <a:rPr lang="en-US" sz="2000" dirty="0"/>
+              <a:t> for ignition and injection</a:t>
+            </a:r>
+          </a:p>
+          <a:p>
+            <a:pPr algn="ctr"/>
+            <a:r>
+              <a:rPr lang="en-US" sz="2000" dirty="0"/>
+              <a:t>- Control </a:t>
+            </a:r>
+            <a:r>
+              <a:rPr lang="en-US" sz="2000" dirty="0" err="1"/>
+              <a:t>autogear</a:t>
+            </a:r>
+            <a:endParaRPr lang="en-US" sz="2000" dirty="0"/>
+          </a:p>
+          <a:p>
+            <a:pPr algn="ctr"/>
+            <a:r>
+              <a:rPr lang="en-US" sz="2000" dirty="0"/>
+              <a:t>- Control starter engine</a:t>
+            </a:r>
+            <a:endParaRPr lang="da-DK" sz="2000" dirty="0"/>
+          </a:p>
+        </p:txBody>
+      </p:sp>
+      <p:sp>
+        <p:nvSpPr>
+          <p:cNvPr id="55" name="Tekstfelt 54">
+            <a:extLst>
+              <a:ext uri="{FF2B5EF4-FFF2-40B4-BE49-F238E27FC236}">
+                <a16:creationId xmlns:a16="http://schemas.microsoft.com/office/drawing/2014/main" id="{542A5E4B-D77A-4044-8E17-FC32A48738DB}"/>
+              </a:ext>
+            </a:extLst>
+          </p:cNvPr>
+          <p:cNvSpPr txBox="1"/>
+          <p:nvPr/>
+        </p:nvSpPr>
+        <p:spPr>
+          <a:xfrm>
+            <a:off x="24576757" y="22213624"/>
+            <a:ext cx="2374960" cy="369332"/>
+          </a:xfrm>
+          <a:prstGeom prst="rect">
+            <a:avLst/>
+          </a:prstGeom>
+          <a:noFill/>
+        </p:spPr>
+        <p:txBody>
+          <a:bodyPr wrap="square" rtlCol="0">
+            <a:spAutoFit/>
+          </a:bodyPr>
+          <a:lstStyle/>
+          <a:p>
+            <a:pPr algn="ctr"/>
+            <a:r>
+              <a:rPr lang="en-US" dirty="0" err="1"/>
+              <a:t>ecuTimerCallback</a:t>
+            </a:r>
+            <a:r>
+              <a:rPr lang="en-US" dirty="0"/>
+              <a:t>()</a:t>
+            </a:r>
+            <a:endParaRPr lang="da-DK" dirty="0"/>
+          </a:p>
+        </p:txBody>
+      </p:sp>
+      <p:sp>
+        <p:nvSpPr>
+          <p:cNvPr id="56" name="Tekstfelt 55">
+            <a:extLst>
+              <a:ext uri="{FF2B5EF4-FFF2-40B4-BE49-F238E27FC236}">
+                <a16:creationId xmlns:a16="http://schemas.microsoft.com/office/drawing/2014/main" id="{12267427-2F25-48DC-8362-470EB8D580E1}"/>
+              </a:ext>
+            </a:extLst>
+          </p:cNvPr>
+          <p:cNvSpPr txBox="1"/>
+          <p:nvPr/>
+        </p:nvSpPr>
+        <p:spPr>
+          <a:xfrm>
+            <a:off x="24618714" y="24401779"/>
+            <a:ext cx="3248220" cy="369332"/>
+          </a:xfrm>
+          <a:prstGeom prst="rect">
+            <a:avLst/>
+          </a:prstGeom>
+          <a:noFill/>
+        </p:spPr>
+        <p:txBody>
+          <a:bodyPr wrap="square" rtlCol="0">
+            <a:spAutoFit/>
+          </a:bodyPr>
+          <a:lstStyle/>
+          <a:p>
+            <a:pPr algn="ctr"/>
+            <a:r>
+              <a:rPr lang="en-US" dirty="0" err="1"/>
+              <a:t>encoderInterruptHandler</a:t>
+            </a:r>
+            <a:r>
+              <a:rPr lang="en-US" dirty="0"/>
+              <a:t>()</a:t>
+            </a:r>
+            <a:endParaRPr lang="da-DK" dirty="0"/>
+          </a:p>
+        </p:txBody>
+      </p:sp>
+      <p:sp>
+        <p:nvSpPr>
+          <p:cNvPr id="57" name="Tekstfelt 56">
+            <a:extLst>
+              <a:ext uri="{FF2B5EF4-FFF2-40B4-BE49-F238E27FC236}">
+                <a16:creationId xmlns:a16="http://schemas.microsoft.com/office/drawing/2014/main" id="{8EB88093-40F4-4BE6-A522-5602134B0DD0}"/>
+              </a:ext>
+            </a:extLst>
+          </p:cNvPr>
+          <p:cNvSpPr txBox="1"/>
+          <p:nvPr/>
+        </p:nvSpPr>
+        <p:spPr>
+          <a:xfrm>
+            <a:off x="22585146" y="24897928"/>
+            <a:ext cx="2110760" cy="369332"/>
+          </a:xfrm>
+          <a:prstGeom prst="rect">
+            <a:avLst/>
+          </a:prstGeom>
+          <a:noFill/>
+        </p:spPr>
+        <p:txBody>
+          <a:bodyPr wrap="square" rtlCol="0">
+            <a:spAutoFit/>
+          </a:bodyPr>
+          <a:lstStyle/>
+          <a:p>
+            <a:pPr algn="ctr"/>
+            <a:r>
+              <a:rPr lang="en-US" dirty="0"/>
+              <a:t>Z pulse</a:t>
+            </a:r>
+            <a:endParaRPr lang="da-DK" dirty="0"/>
+          </a:p>
+        </p:txBody>
+      </p:sp>
+      <p:sp>
+        <p:nvSpPr>
+          <p:cNvPr id="58" name="Tekstfelt 57">
+            <a:extLst>
+              <a:ext uri="{FF2B5EF4-FFF2-40B4-BE49-F238E27FC236}">
+                <a16:creationId xmlns:a16="http://schemas.microsoft.com/office/drawing/2014/main" id="{12CE83F3-A8FC-49E4-9DEC-115F778545B8}"/>
+              </a:ext>
+            </a:extLst>
+          </p:cNvPr>
+          <p:cNvSpPr txBox="1"/>
+          <p:nvPr/>
+        </p:nvSpPr>
+        <p:spPr>
+          <a:xfrm>
+            <a:off x="25268302" y="24824690"/>
+            <a:ext cx="3248220" cy="1938992"/>
+          </a:xfrm>
+          <a:prstGeom prst="rect">
+            <a:avLst/>
+          </a:prstGeom>
+          <a:noFill/>
+        </p:spPr>
+        <p:txBody>
+          <a:bodyPr wrap="square" rtlCol="0">
+            <a:spAutoFit/>
+          </a:bodyPr>
+          <a:lstStyle/>
+          <a:p>
+            <a:pPr marL="285750" indent="-285750" algn="ctr">
+              <a:buFontTx/>
+              <a:buChar char="-"/>
+            </a:pPr>
+            <a:r>
+              <a:rPr lang="en-US" sz="2000" dirty="0"/>
+              <a:t>Reset motor quadrature decoder</a:t>
+            </a:r>
+          </a:p>
+          <a:p>
+            <a:pPr marL="285750" indent="-285750" algn="ctr">
+              <a:buFontTx/>
+              <a:buChar char="-"/>
+            </a:pPr>
+            <a:r>
+              <a:rPr lang="en-US" sz="2000" dirty="0"/>
+              <a:t>Attach compare</a:t>
+            </a:r>
+            <a:r>
+              <a:rPr lang="da-DK" sz="2000" dirty="0"/>
+              <a:t> </a:t>
+            </a:r>
+            <a:r>
+              <a:rPr lang="da-DK" sz="2000" dirty="0" err="1"/>
+              <a:t>inturrupts</a:t>
+            </a:r>
+            <a:r>
+              <a:rPr lang="da-DK" sz="2000" dirty="0"/>
+              <a:t> to </a:t>
+            </a:r>
+            <a:r>
+              <a:rPr lang="da-DK" sz="2000" dirty="0" err="1"/>
+              <a:t>ignition</a:t>
+            </a:r>
+            <a:r>
+              <a:rPr lang="da-DK" sz="2000" dirty="0"/>
+              <a:t> and </a:t>
+            </a:r>
+            <a:r>
+              <a:rPr lang="da-DK" sz="2000" dirty="0" err="1"/>
+              <a:t>injection</a:t>
+            </a:r>
+            <a:r>
+              <a:rPr lang="da-DK" sz="2000" dirty="0"/>
+              <a:t> start angle and </a:t>
+            </a:r>
+            <a:r>
+              <a:rPr lang="da-DK" sz="2000" dirty="0" err="1"/>
+              <a:t>injection</a:t>
+            </a:r>
+            <a:r>
+              <a:rPr lang="da-DK" sz="2000" dirty="0"/>
+              <a:t> start angle</a:t>
+            </a:r>
+            <a:endParaRPr lang="en-US" sz="2000" dirty="0"/>
+          </a:p>
+        </p:txBody>
+      </p:sp>
+      <p:sp>
+        <p:nvSpPr>
+          <p:cNvPr id="59" name="Tekstfelt 58">
+            <a:extLst>
+              <a:ext uri="{FF2B5EF4-FFF2-40B4-BE49-F238E27FC236}">
+                <a16:creationId xmlns:a16="http://schemas.microsoft.com/office/drawing/2014/main" id="{9C6804EF-EDC8-4AF9-8D99-1D93B3575FA0}"/>
+              </a:ext>
+            </a:extLst>
+          </p:cNvPr>
+          <p:cNvSpPr txBox="1"/>
+          <p:nvPr/>
+        </p:nvSpPr>
+        <p:spPr>
+          <a:xfrm>
+            <a:off x="17415545" y="26373163"/>
+            <a:ext cx="2138882" cy="1323439"/>
+          </a:xfrm>
+          <a:prstGeom prst="rect">
+            <a:avLst/>
+          </a:prstGeom>
+          <a:noFill/>
+        </p:spPr>
+        <p:txBody>
+          <a:bodyPr wrap="square" rtlCol="0">
+            <a:spAutoFit/>
+          </a:bodyPr>
+          <a:lstStyle/>
+          <a:p>
+            <a:pPr algn="ctr"/>
+            <a:r>
+              <a:rPr lang="en-US" sz="2000" dirty="0"/>
+              <a:t>Communication:</a:t>
+            </a:r>
+            <a:br>
+              <a:rPr lang="en-US" sz="2000" dirty="0"/>
+            </a:br>
+            <a:r>
+              <a:rPr lang="en-US" sz="2000" dirty="0"/>
+              <a:t>- with </a:t>
+            </a:r>
+            <a:r>
+              <a:rPr lang="en-US" sz="2000" dirty="0" err="1"/>
+              <a:t>CANbus</a:t>
+            </a:r>
+            <a:br>
+              <a:rPr lang="en-US" sz="2000" dirty="0"/>
+            </a:br>
+            <a:r>
+              <a:rPr lang="en-US" sz="2000" dirty="0">
+                <a:solidFill>
+                  <a:srgbClr val="FF0000"/>
+                </a:solidFill>
+              </a:rPr>
+              <a:t>- with Bluetooth</a:t>
+            </a:r>
+            <a:br>
+              <a:rPr lang="en-US" sz="2000" dirty="0">
+                <a:solidFill>
+                  <a:srgbClr val="FF0000"/>
+                </a:solidFill>
+              </a:rPr>
+            </a:br>
+            <a:r>
+              <a:rPr lang="en-US" sz="2000" dirty="0"/>
+              <a:t>- with PC UI</a:t>
+            </a:r>
+            <a:endParaRPr lang="da-DK" sz="2000" dirty="0"/>
+          </a:p>
+        </p:txBody>
+      </p:sp>
+      <p:sp>
+        <p:nvSpPr>
+          <p:cNvPr id="60" name="Tekstfelt 59">
+            <a:extLst>
+              <a:ext uri="{FF2B5EF4-FFF2-40B4-BE49-F238E27FC236}">
+                <a16:creationId xmlns:a16="http://schemas.microsoft.com/office/drawing/2014/main" id="{1411AE82-0DEF-456D-832E-CD2A8DE27F37}"/>
+              </a:ext>
+            </a:extLst>
+          </p:cNvPr>
+          <p:cNvSpPr txBox="1"/>
+          <p:nvPr/>
+        </p:nvSpPr>
+        <p:spPr>
+          <a:xfrm>
+            <a:off x="17696271" y="28418149"/>
+            <a:ext cx="1584176" cy="369332"/>
+          </a:xfrm>
+          <a:prstGeom prst="rect">
+            <a:avLst/>
+          </a:prstGeom>
+          <a:noFill/>
+        </p:spPr>
+        <p:txBody>
+          <a:bodyPr wrap="square" rtlCol="0">
+            <a:spAutoFit/>
+          </a:bodyPr>
+          <a:lstStyle/>
+          <a:p>
+            <a:pPr algn="ctr"/>
+            <a:r>
+              <a:rPr lang="en-US" dirty="0"/>
+              <a:t>Emergency?</a:t>
+            </a:r>
+            <a:endParaRPr lang="da-DK" dirty="0"/>
+          </a:p>
+        </p:txBody>
+      </p:sp>
+      <p:sp>
+        <p:nvSpPr>
+          <p:cNvPr id="61" name="Tekstfelt 60">
+            <a:extLst>
+              <a:ext uri="{FF2B5EF4-FFF2-40B4-BE49-F238E27FC236}">
+                <a16:creationId xmlns:a16="http://schemas.microsoft.com/office/drawing/2014/main" id="{6E67A388-D05A-4A20-8C4B-D134DDA94A94}"/>
+              </a:ext>
+            </a:extLst>
+          </p:cNvPr>
+          <p:cNvSpPr txBox="1"/>
+          <p:nvPr/>
+        </p:nvSpPr>
+        <p:spPr>
+          <a:xfrm>
+            <a:off x="20396571" y="29158161"/>
+            <a:ext cx="1584176" cy="923330"/>
+          </a:xfrm>
+          <a:prstGeom prst="rect">
+            <a:avLst/>
+          </a:prstGeom>
+          <a:noFill/>
+        </p:spPr>
+        <p:txBody>
+          <a:bodyPr wrap="square" rtlCol="0">
+            <a:spAutoFit/>
+          </a:bodyPr>
+          <a:lstStyle/>
+          <a:p>
+            <a:pPr algn="ctr"/>
+            <a:r>
+              <a:rPr lang="en-US" dirty="0">
+                <a:solidFill>
+                  <a:srgbClr val="FF0000"/>
+                </a:solidFill>
+              </a:rPr>
+              <a:t>Sing emergency</a:t>
+            </a:r>
+          </a:p>
+          <a:p>
+            <a:pPr algn="ctr"/>
+            <a:r>
+              <a:rPr lang="en-US" dirty="0">
+                <a:solidFill>
+                  <a:srgbClr val="FF0000"/>
+                </a:solidFill>
+              </a:rPr>
+              <a:t>song</a:t>
+            </a:r>
+            <a:endParaRPr lang="da-DK" dirty="0">
+              <a:solidFill>
+                <a:srgbClr val="FF0000"/>
+              </a:solidFill>
+            </a:endParaRPr>
+          </a:p>
+        </p:txBody>
+      </p:sp>
+      <p:sp>
+        <p:nvSpPr>
+          <p:cNvPr id="62" name="Tekstfelt 61">
+            <a:extLst>
+              <a:ext uri="{FF2B5EF4-FFF2-40B4-BE49-F238E27FC236}">
+                <a16:creationId xmlns:a16="http://schemas.microsoft.com/office/drawing/2014/main" id="{4A210A17-3859-466C-92FC-F6A0379E9AEF}"/>
+              </a:ext>
+            </a:extLst>
+          </p:cNvPr>
+          <p:cNvSpPr txBox="1"/>
+          <p:nvPr/>
+        </p:nvSpPr>
+        <p:spPr>
+          <a:xfrm>
+            <a:off x="19619358" y="28267895"/>
+            <a:ext cx="1584176" cy="369332"/>
+          </a:xfrm>
+          <a:prstGeom prst="rect">
+            <a:avLst/>
+          </a:prstGeom>
+          <a:noFill/>
+        </p:spPr>
+        <p:txBody>
+          <a:bodyPr wrap="square" rtlCol="0">
+            <a:spAutoFit/>
+          </a:bodyPr>
+          <a:lstStyle/>
+          <a:p>
+            <a:pPr algn="ctr"/>
+            <a:r>
+              <a:rPr lang="en-US" dirty="0"/>
+              <a:t>Yes</a:t>
+            </a:r>
+            <a:endParaRPr lang="da-DK" dirty="0"/>
+          </a:p>
+        </p:txBody>
+      </p:sp>
+      <p:sp>
+        <p:nvSpPr>
+          <p:cNvPr id="63" name="Tekstfelt 62">
+            <a:extLst>
+              <a:ext uri="{FF2B5EF4-FFF2-40B4-BE49-F238E27FC236}">
+                <a16:creationId xmlns:a16="http://schemas.microsoft.com/office/drawing/2014/main" id="{89C1DB79-33CE-460A-9CD4-D4D015D60E9F}"/>
+              </a:ext>
+            </a:extLst>
+          </p:cNvPr>
+          <p:cNvSpPr txBox="1"/>
+          <p:nvPr/>
+        </p:nvSpPr>
+        <p:spPr>
+          <a:xfrm>
+            <a:off x="18383287" y="25353664"/>
+            <a:ext cx="645132" cy="369332"/>
+          </a:xfrm>
+          <a:prstGeom prst="rect">
+            <a:avLst/>
+          </a:prstGeom>
+          <a:noFill/>
+        </p:spPr>
+        <p:txBody>
+          <a:bodyPr wrap="square" rtlCol="0">
+            <a:spAutoFit/>
+          </a:bodyPr>
+          <a:lstStyle/>
+          <a:p>
+            <a:pPr algn="ctr"/>
+            <a:r>
+              <a:rPr lang="en-US" dirty="0"/>
+              <a:t>No</a:t>
+            </a:r>
+            <a:endParaRPr lang="da-DK" dirty="0"/>
+          </a:p>
+        </p:txBody>
+      </p:sp>
+      <p:sp>
+        <p:nvSpPr>
+          <p:cNvPr id="64" name="Tekstfelt 63">
+            <a:extLst>
+              <a:ext uri="{FF2B5EF4-FFF2-40B4-BE49-F238E27FC236}">
+                <a16:creationId xmlns:a16="http://schemas.microsoft.com/office/drawing/2014/main" id="{5BB2FCB1-3166-494F-8F6B-FC0866FF3DC5}"/>
+              </a:ext>
+            </a:extLst>
+          </p:cNvPr>
+          <p:cNvSpPr txBox="1"/>
+          <p:nvPr/>
+        </p:nvSpPr>
+        <p:spPr>
+          <a:xfrm>
+            <a:off x="26407367" y="27291387"/>
+            <a:ext cx="2413696" cy="1631216"/>
+          </a:xfrm>
+          <a:prstGeom prst="rect">
+            <a:avLst/>
+          </a:prstGeom>
+          <a:noFill/>
+        </p:spPr>
+        <p:txBody>
+          <a:bodyPr wrap="square" rtlCol="0">
+            <a:spAutoFit/>
+          </a:bodyPr>
+          <a:lstStyle/>
+          <a:p>
+            <a:pPr algn="ctr"/>
+            <a:r>
+              <a:rPr lang="en-US" sz="2000" dirty="0"/>
+              <a:t>- Injection or ignition started</a:t>
+            </a:r>
+            <a:br>
+              <a:rPr lang="en-US" sz="2000" dirty="0"/>
+            </a:br>
+            <a:r>
+              <a:rPr lang="en-US" sz="2000" dirty="0"/>
+              <a:t>-Injection or ignition or ignition stop timer</a:t>
+            </a:r>
+          </a:p>
+        </p:txBody>
+      </p:sp>
+      <p:sp>
+        <p:nvSpPr>
+          <p:cNvPr id="65" name="Tekstfelt 64">
+            <a:extLst>
+              <a:ext uri="{FF2B5EF4-FFF2-40B4-BE49-F238E27FC236}">
+                <a16:creationId xmlns:a16="http://schemas.microsoft.com/office/drawing/2014/main" id="{44176561-65BF-45F8-B89B-927DC1975E92}"/>
+              </a:ext>
+            </a:extLst>
+          </p:cNvPr>
+          <p:cNvSpPr txBox="1"/>
+          <p:nvPr/>
+        </p:nvSpPr>
+        <p:spPr>
+          <a:xfrm>
+            <a:off x="22417312" y="27329859"/>
+            <a:ext cx="3674626" cy="369332"/>
+          </a:xfrm>
+          <a:prstGeom prst="rect">
+            <a:avLst/>
+          </a:prstGeom>
+          <a:noFill/>
+        </p:spPr>
+        <p:txBody>
+          <a:bodyPr wrap="square" rtlCol="0">
+            <a:spAutoFit/>
+          </a:bodyPr>
+          <a:lstStyle/>
+          <a:p>
+            <a:pPr algn="ctr"/>
+            <a:r>
+              <a:rPr lang="en-US" dirty="0"/>
+              <a:t>Motor angle = injection angle</a:t>
+            </a:r>
+            <a:endParaRPr lang="da-DK" dirty="0"/>
+          </a:p>
+        </p:txBody>
+      </p:sp>
+      <p:sp>
+        <p:nvSpPr>
+          <p:cNvPr id="66" name="Tekstfelt 65">
+            <a:extLst>
+              <a:ext uri="{FF2B5EF4-FFF2-40B4-BE49-F238E27FC236}">
+                <a16:creationId xmlns:a16="http://schemas.microsoft.com/office/drawing/2014/main" id="{00DE5F64-E537-47B6-8402-A46225FEB954}"/>
+              </a:ext>
+            </a:extLst>
+          </p:cNvPr>
+          <p:cNvSpPr txBox="1"/>
+          <p:nvPr/>
+        </p:nvSpPr>
+        <p:spPr>
+          <a:xfrm>
+            <a:off x="22369468" y="27820902"/>
+            <a:ext cx="3674626" cy="369332"/>
+          </a:xfrm>
+          <a:prstGeom prst="rect">
+            <a:avLst/>
+          </a:prstGeom>
+          <a:noFill/>
+        </p:spPr>
+        <p:txBody>
+          <a:bodyPr wrap="square" rtlCol="0">
+            <a:spAutoFit/>
+          </a:bodyPr>
+          <a:lstStyle/>
+          <a:p>
+            <a:pPr algn="ctr"/>
+            <a:r>
+              <a:rPr lang="en-US" dirty="0"/>
+              <a:t>Motor angle = ignition angle</a:t>
+            </a:r>
+            <a:endParaRPr lang="da-DK" dirty="0"/>
+          </a:p>
+        </p:txBody>
+      </p:sp>
+      <p:sp>
+        <p:nvSpPr>
+          <p:cNvPr id="67" name="Tekstfelt 66">
+            <a:extLst>
+              <a:ext uri="{FF2B5EF4-FFF2-40B4-BE49-F238E27FC236}">
+                <a16:creationId xmlns:a16="http://schemas.microsoft.com/office/drawing/2014/main" id="{7709B0D1-2C76-44A3-BECD-4AB7D26C6670}"/>
+              </a:ext>
+            </a:extLst>
+          </p:cNvPr>
+          <p:cNvSpPr txBox="1"/>
+          <p:nvPr/>
+        </p:nvSpPr>
+        <p:spPr>
+          <a:xfrm>
+            <a:off x="22448227" y="29464012"/>
+            <a:ext cx="3674626" cy="369332"/>
+          </a:xfrm>
+          <a:prstGeom prst="rect">
+            <a:avLst/>
+          </a:prstGeom>
+          <a:noFill/>
+        </p:spPr>
+        <p:txBody>
+          <a:bodyPr wrap="square" rtlCol="0">
+            <a:spAutoFit/>
+          </a:bodyPr>
+          <a:lstStyle/>
+          <a:p>
+            <a:pPr algn="ctr"/>
+            <a:r>
+              <a:rPr lang="en-US" dirty="0"/>
+              <a:t>Injection stop time out</a:t>
+            </a:r>
+            <a:endParaRPr lang="da-DK" dirty="0"/>
+          </a:p>
+        </p:txBody>
+      </p:sp>
+      <p:sp>
+        <p:nvSpPr>
+          <p:cNvPr id="68" name="Tekstfelt 67">
+            <a:extLst>
+              <a:ext uri="{FF2B5EF4-FFF2-40B4-BE49-F238E27FC236}">
+                <a16:creationId xmlns:a16="http://schemas.microsoft.com/office/drawing/2014/main" id="{2F34DE19-0835-4470-B6D9-38EDDB967AED}"/>
+              </a:ext>
+            </a:extLst>
+          </p:cNvPr>
+          <p:cNvSpPr txBox="1"/>
+          <p:nvPr/>
+        </p:nvSpPr>
+        <p:spPr>
+          <a:xfrm>
+            <a:off x="26105528" y="29851243"/>
+            <a:ext cx="3050014" cy="369332"/>
+          </a:xfrm>
+          <a:prstGeom prst="rect">
+            <a:avLst/>
+          </a:prstGeom>
+          <a:noFill/>
+        </p:spPr>
+        <p:txBody>
+          <a:bodyPr wrap="square" rtlCol="0">
+            <a:spAutoFit/>
+          </a:bodyPr>
+          <a:lstStyle/>
+          <a:p>
+            <a:pPr algn="ctr"/>
+            <a:r>
+              <a:rPr lang="en-US" dirty="0"/>
+              <a:t>Stop injection</a:t>
+            </a:r>
+            <a:endParaRPr lang="da-DK" dirty="0"/>
+          </a:p>
+        </p:txBody>
+      </p:sp>
+      <p:sp>
+        <p:nvSpPr>
+          <p:cNvPr id="69" name="Tekstfelt 68">
+            <a:extLst>
+              <a:ext uri="{FF2B5EF4-FFF2-40B4-BE49-F238E27FC236}">
+                <a16:creationId xmlns:a16="http://schemas.microsoft.com/office/drawing/2014/main" id="{F37BCFA1-F0CD-4B75-8CB0-DA74C776CEF8}"/>
+              </a:ext>
+            </a:extLst>
+          </p:cNvPr>
+          <p:cNvSpPr txBox="1"/>
+          <p:nvPr/>
+        </p:nvSpPr>
+        <p:spPr>
+          <a:xfrm>
+            <a:off x="25878660" y="29338973"/>
+            <a:ext cx="3050014" cy="369332"/>
+          </a:xfrm>
+          <a:prstGeom prst="rect">
+            <a:avLst/>
+          </a:prstGeom>
+          <a:noFill/>
+        </p:spPr>
+        <p:txBody>
+          <a:bodyPr wrap="square" rtlCol="0">
+            <a:spAutoFit/>
+          </a:bodyPr>
+          <a:lstStyle/>
+          <a:p>
+            <a:pPr algn="ctr"/>
+            <a:r>
+              <a:rPr lang="en-US" dirty="0" err="1"/>
+              <a:t>InjectionDelayCallback</a:t>
+            </a:r>
+            <a:r>
+              <a:rPr lang="en-US" dirty="0"/>
+              <a:t>()</a:t>
+            </a:r>
+            <a:endParaRPr lang="da-DK" dirty="0"/>
+          </a:p>
+        </p:txBody>
+      </p:sp>
+      <p:sp>
+        <p:nvSpPr>
+          <p:cNvPr id="70" name="Tekstfelt 69">
+            <a:extLst>
+              <a:ext uri="{FF2B5EF4-FFF2-40B4-BE49-F238E27FC236}">
+                <a16:creationId xmlns:a16="http://schemas.microsoft.com/office/drawing/2014/main" id="{4280DDB7-732C-42FE-83F8-69BDC6B36626}"/>
+              </a:ext>
+            </a:extLst>
+          </p:cNvPr>
+          <p:cNvSpPr txBox="1"/>
+          <p:nvPr/>
+        </p:nvSpPr>
+        <p:spPr>
+          <a:xfrm>
+            <a:off x="25764237" y="26913106"/>
+            <a:ext cx="1659720" cy="369332"/>
+          </a:xfrm>
+          <a:prstGeom prst="rect">
+            <a:avLst/>
+          </a:prstGeom>
+          <a:noFill/>
+        </p:spPr>
+        <p:txBody>
+          <a:bodyPr wrap="square" rtlCol="0">
+            <a:spAutoFit/>
+          </a:bodyPr>
+          <a:lstStyle/>
+          <a:p>
+            <a:pPr algn="ctr"/>
+            <a:r>
+              <a:rPr lang="en-US" dirty="0"/>
+              <a:t>ftm2_isr()</a:t>
+            </a:r>
+            <a:endParaRPr lang="da-DK" dirty="0"/>
+          </a:p>
+        </p:txBody>
+      </p:sp>
+      <p:sp>
+        <p:nvSpPr>
+          <p:cNvPr id="71" name="Tekstfelt 70">
+            <a:extLst>
+              <a:ext uri="{FF2B5EF4-FFF2-40B4-BE49-F238E27FC236}">
+                <a16:creationId xmlns:a16="http://schemas.microsoft.com/office/drawing/2014/main" id="{A770EE8A-E9D8-493F-A6D3-F1F2408F6464}"/>
+              </a:ext>
+            </a:extLst>
+          </p:cNvPr>
+          <p:cNvSpPr txBox="1"/>
+          <p:nvPr/>
+        </p:nvSpPr>
+        <p:spPr>
+          <a:xfrm>
+            <a:off x="25771049" y="30457347"/>
+            <a:ext cx="3050014" cy="369332"/>
+          </a:xfrm>
+          <a:prstGeom prst="rect">
+            <a:avLst/>
+          </a:prstGeom>
+          <a:noFill/>
+        </p:spPr>
+        <p:txBody>
+          <a:bodyPr wrap="square" rtlCol="0">
+            <a:spAutoFit/>
+          </a:bodyPr>
+          <a:lstStyle/>
+          <a:p>
+            <a:pPr algn="ctr"/>
+            <a:r>
+              <a:rPr lang="en-US" dirty="0" err="1"/>
+              <a:t>IgnitionDelayCallback</a:t>
+            </a:r>
+            <a:r>
+              <a:rPr lang="en-US" dirty="0"/>
+              <a:t>()</a:t>
+            </a:r>
+            <a:endParaRPr lang="da-DK" dirty="0"/>
+          </a:p>
+        </p:txBody>
+      </p:sp>
+      <p:sp>
+        <p:nvSpPr>
+          <p:cNvPr id="72" name="Tekstfelt 71">
+            <a:extLst>
+              <a:ext uri="{FF2B5EF4-FFF2-40B4-BE49-F238E27FC236}">
+                <a16:creationId xmlns:a16="http://schemas.microsoft.com/office/drawing/2014/main" id="{243BB8BC-40A1-40B4-ACF3-F61023964823}"/>
+              </a:ext>
+            </a:extLst>
+          </p:cNvPr>
+          <p:cNvSpPr txBox="1"/>
+          <p:nvPr/>
+        </p:nvSpPr>
+        <p:spPr>
+          <a:xfrm>
+            <a:off x="22760533" y="30550228"/>
+            <a:ext cx="3050014" cy="369332"/>
+          </a:xfrm>
+          <a:prstGeom prst="rect">
+            <a:avLst/>
+          </a:prstGeom>
+          <a:noFill/>
+        </p:spPr>
+        <p:txBody>
+          <a:bodyPr wrap="square" rtlCol="0">
+            <a:spAutoFit/>
+          </a:bodyPr>
+          <a:lstStyle/>
+          <a:p>
+            <a:pPr algn="ctr"/>
+            <a:r>
+              <a:rPr lang="en-US" dirty="0"/>
+              <a:t>Ignition stop time out</a:t>
+            </a:r>
+            <a:endParaRPr lang="da-DK" dirty="0"/>
+          </a:p>
+        </p:txBody>
+      </p:sp>
+      <p:sp>
+        <p:nvSpPr>
+          <p:cNvPr id="73" name="Tekstfelt 72">
+            <a:extLst>
+              <a:ext uri="{FF2B5EF4-FFF2-40B4-BE49-F238E27FC236}">
+                <a16:creationId xmlns:a16="http://schemas.microsoft.com/office/drawing/2014/main" id="{07E0483B-ECD2-415C-B1C5-E06367314EA4}"/>
+              </a:ext>
+            </a:extLst>
+          </p:cNvPr>
+          <p:cNvSpPr txBox="1"/>
+          <p:nvPr/>
+        </p:nvSpPr>
+        <p:spPr>
+          <a:xfrm>
+            <a:off x="26011106" y="30939751"/>
+            <a:ext cx="3050014" cy="369332"/>
+          </a:xfrm>
+          <a:prstGeom prst="rect">
+            <a:avLst/>
+          </a:prstGeom>
+          <a:noFill/>
+        </p:spPr>
+        <p:txBody>
+          <a:bodyPr wrap="square" rtlCol="0">
+            <a:spAutoFit/>
+          </a:bodyPr>
+          <a:lstStyle/>
+          <a:p>
+            <a:pPr algn="ctr"/>
+            <a:r>
+              <a:rPr lang="en-US" dirty="0"/>
+              <a:t>Stop ignition</a:t>
+            </a:r>
+            <a:endParaRPr lang="da-DK" dirty="0"/>
+          </a:p>
+        </p:txBody>
+      </p:sp>
+      <p:sp>
+        <p:nvSpPr>
+          <p:cNvPr id="74" name="Tekstfelt 73">
+            <a:extLst>
+              <a:ext uri="{FF2B5EF4-FFF2-40B4-BE49-F238E27FC236}">
+                <a16:creationId xmlns:a16="http://schemas.microsoft.com/office/drawing/2014/main" id="{AE56CFF4-CFA1-4D1F-9348-2F784C439667}"/>
+              </a:ext>
+            </a:extLst>
+          </p:cNvPr>
+          <p:cNvSpPr txBox="1"/>
+          <p:nvPr/>
+        </p:nvSpPr>
+        <p:spPr>
+          <a:xfrm>
+            <a:off x="17970251" y="29483320"/>
+            <a:ext cx="1584176" cy="369332"/>
+          </a:xfrm>
+          <a:prstGeom prst="rect">
+            <a:avLst/>
+          </a:prstGeom>
+          <a:noFill/>
+        </p:spPr>
+        <p:txBody>
+          <a:bodyPr wrap="square" rtlCol="0">
+            <a:spAutoFit/>
+          </a:bodyPr>
+          <a:lstStyle/>
+          <a:p>
+            <a:pPr algn="ctr"/>
+            <a:r>
+              <a:rPr lang="en-US" dirty="0"/>
+              <a:t>No</a:t>
+            </a:r>
+            <a:endParaRPr lang="da-DK" dirty="0"/>
+          </a:p>
+        </p:txBody>
+      </p:sp>
+      <p:sp>
+        <p:nvSpPr>
+          <p:cNvPr id="75" name="Tekstfelt 74">
+            <a:extLst>
+              <a:ext uri="{FF2B5EF4-FFF2-40B4-BE49-F238E27FC236}">
+                <a16:creationId xmlns:a16="http://schemas.microsoft.com/office/drawing/2014/main" id="{306DCAD0-D353-4349-83E1-CBA77496E041}"/>
+              </a:ext>
+            </a:extLst>
+          </p:cNvPr>
+          <p:cNvSpPr txBox="1"/>
+          <p:nvPr/>
+        </p:nvSpPr>
+        <p:spPr>
+          <a:xfrm>
+            <a:off x="17732275" y="30900026"/>
+            <a:ext cx="1584176" cy="369332"/>
+          </a:xfrm>
+          <a:prstGeom prst="rect">
+            <a:avLst/>
+          </a:prstGeom>
+          <a:noFill/>
+        </p:spPr>
+        <p:txBody>
+          <a:bodyPr wrap="square" rtlCol="0">
+            <a:spAutoFit/>
+          </a:bodyPr>
+          <a:lstStyle/>
+          <a:p>
+            <a:pPr algn="ctr"/>
+            <a:r>
+              <a:rPr lang="en-US" dirty="0">
+                <a:solidFill>
+                  <a:srgbClr val="FF0000"/>
+                </a:solidFill>
+              </a:rPr>
+              <a:t>Party?</a:t>
+            </a:r>
+            <a:endParaRPr lang="da-DK" dirty="0">
+              <a:solidFill>
+                <a:srgbClr val="FF0000"/>
+              </a:solidFill>
+            </a:endParaRPr>
+          </a:p>
+        </p:txBody>
+      </p:sp>
+      <p:sp>
+        <p:nvSpPr>
+          <p:cNvPr id="76" name="Tekstfelt 75">
+            <a:extLst>
+              <a:ext uri="{FF2B5EF4-FFF2-40B4-BE49-F238E27FC236}">
+                <a16:creationId xmlns:a16="http://schemas.microsoft.com/office/drawing/2014/main" id="{54E25123-3F19-4BA6-A011-F82B9346E157}"/>
+              </a:ext>
+            </a:extLst>
+          </p:cNvPr>
+          <p:cNvSpPr txBox="1"/>
+          <p:nvPr/>
+        </p:nvSpPr>
+        <p:spPr>
+          <a:xfrm>
+            <a:off x="18879011" y="30631635"/>
+            <a:ext cx="1584176" cy="369332"/>
+          </a:xfrm>
+          <a:prstGeom prst="rect">
+            <a:avLst/>
+          </a:prstGeom>
+          <a:noFill/>
+        </p:spPr>
+        <p:txBody>
+          <a:bodyPr wrap="square" rtlCol="0">
+            <a:spAutoFit/>
+          </a:bodyPr>
+          <a:lstStyle/>
+          <a:p>
+            <a:pPr algn="ctr"/>
+            <a:r>
+              <a:rPr lang="en-US" dirty="0"/>
+              <a:t>Yes</a:t>
+            </a:r>
+            <a:endParaRPr lang="da-DK" dirty="0"/>
+          </a:p>
+        </p:txBody>
+      </p:sp>
+      <p:sp>
+        <p:nvSpPr>
+          <p:cNvPr id="77" name="Tekstfelt 76">
+            <a:extLst>
+              <a:ext uri="{FF2B5EF4-FFF2-40B4-BE49-F238E27FC236}">
+                <a16:creationId xmlns:a16="http://schemas.microsoft.com/office/drawing/2014/main" id="{16EF720E-16B4-42D7-853B-3C4FF5BFCE7B}"/>
+              </a:ext>
+            </a:extLst>
+          </p:cNvPr>
+          <p:cNvSpPr txBox="1"/>
+          <p:nvPr/>
+        </p:nvSpPr>
+        <p:spPr>
+          <a:xfrm>
+            <a:off x="20411673" y="30605349"/>
+            <a:ext cx="1584176" cy="646331"/>
+          </a:xfrm>
+          <a:prstGeom prst="rect">
+            <a:avLst/>
+          </a:prstGeom>
+          <a:noFill/>
+        </p:spPr>
+        <p:txBody>
+          <a:bodyPr wrap="square" rtlCol="0">
+            <a:spAutoFit/>
+          </a:bodyPr>
+          <a:lstStyle/>
+          <a:p>
+            <a:pPr algn="ctr"/>
+            <a:r>
+              <a:rPr lang="en-US" dirty="0">
+                <a:solidFill>
+                  <a:srgbClr val="FF0000"/>
+                </a:solidFill>
+              </a:rPr>
+              <a:t>Sing party song</a:t>
+            </a:r>
+            <a:endParaRPr lang="da-DK" dirty="0">
+              <a:solidFill>
+                <a:srgbClr val="FF0000"/>
+              </a:solidFill>
+            </a:endParaRPr>
+          </a:p>
+        </p:txBody>
+      </p:sp>
+      <p:sp>
+        <p:nvSpPr>
+          <p:cNvPr id="78" name="Tekstfelt 77">
+            <a:extLst>
+              <a:ext uri="{FF2B5EF4-FFF2-40B4-BE49-F238E27FC236}">
+                <a16:creationId xmlns:a16="http://schemas.microsoft.com/office/drawing/2014/main" id="{67601BF4-791B-4073-AFA7-C99EADAACACF}"/>
+              </a:ext>
+            </a:extLst>
+          </p:cNvPr>
+          <p:cNvSpPr txBox="1"/>
+          <p:nvPr/>
+        </p:nvSpPr>
+        <p:spPr>
+          <a:xfrm>
+            <a:off x="17675920" y="32231168"/>
+            <a:ext cx="1584176" cy="646331"/>
+          </a:xfrm>
+          <a:prstGeom prst="rect">
+            <a:avLst/>
+          </a:prstGeom>
+          <a:noFill/>
+        </p:spPr>
+        <p:txBody>
+          <a:bodyPr wrap="square" rtlCol="0">
+            <a:spAutoFit/>
+          </a:bodyPr>
+          <a:lstStyle/>
+          <a:p>
+            <a:pPr algn="ctr"/>
+            <a:r>
+              <a:rPr lang="en-US" dirty="0"/>
+              <a:t>Datalogging</a:t>
+            </a:r>
+            <a:r>
+              <a:rPr lang="da-DK" dirty="0"/>
+              <a:t> to SD card</a:t>
+            </a:r>
+            <a:endParaRPr lang="en-US" dirty="0"/>
+          </a:p>
+        </p:txBody>
+      </p:sp>
+      <p:sp>
+        <p:nvSpPr>
+          <p:cNvPr id="79" name="Tekstfelt 78">
+            <a:extLst>
+              <a:ext uri="{FF2B5EF4-FFF2-40B4-BE49-F238E27FC236}">
+                <a16:creationId xmlns:a16="http://schemas.microsoft.com/office/drawing/2014/main" id="{B8E78CF6-443E-45F1-AD4C-E5AC7B3C9A86}"/>
+              </a:ext>
+            </a:extLst>
+          </p:cNvPr>
+          <p:cNvSpPr txBox="1"/>
+          <p:nvPr/>
+        </p:nvSpPr>
+        <p:spPr>
+          <a:xfrm>
+            <a:off x="17444243" y="31522014"/>
+            <a:ext cx="1584176" cy="369332"/>
+          </a:xfrm>
+          <a:prstGeom prst="rect">
+            <a:avLst/>
+          </a:prstGeom>
+          <a:noFill/>
+        </p:spPr>
+        <p:txBody>
+          <a:bodyPr wrap="square" rtlCol="0">
+            <a:spAutoFit/>
+          </a:bodyPr>
+          <a:lstStyle/>
+          <a:p>
+            <a:pPr algn="ctr"/>
+            <a:r>
+              <a:rPr lang="en-US" dirty="0"/>
+              <a:t>No</a:t>
+            </a:r>
+            <a:endParaRPr lang="da-DK" dirty="0"/>
+          </a:p>
+        </p:txBody>
+      </p:sp>
+      <p:sp>
+        <p:nvSpPr>
+          <p:cNvPr id="80" name="Tekstfelt 79">
+            <a:extLst>
+              <a:ext uri="{FF2B5EF4-FFF2-40B4-BE49-F238E27FC236}">
+                <a16:creationId xmlns:a16="http://schemas.microsoft.com/office/drawing/2014/main" id="{D9DB68B3-7DEA-4CB3-8738-B41EBD20E57F}"/>
+              </a:ext>
+            </a:extLst>
+          </p:cNvPr>
+          <p:cNvSpPr txBox="1"/>
+          <p:nvPr/>
+        </p:nvSpPr>
+        <p:spPr>
+          <a:xfrm>
+            <a:off x="17696271" y="33859159"/>
+            <a:ext cx="1584176" cy="923330"/>
+          </a:xfrm>
+          <a:prstGeom prst="rect">
+            <a:avLst/>
+          </a:prstGeom>
+          <a:noFill/>
+        </p:spPr>
+        <p:txBody>
+          <a:bodyPr wrap="square" rtlCol="0">
+            <a:spAutoFit/>
+          </a:bodyPr>
+          <a:lstStyle/>
+          <a:p>
+            <a:pPr algn="ctr"/>
+            <a:r>
+              <a:rPr lang="en-US" dirty="0"/>
+              <a:t>Toggle LED to indicate end of loop</a:t>
+            </a:r>
+            <a:endParaRPr lang="da-DK" dirty="0"/>
+          </a:p>
+        </p:txBody>
+      </p:sp>
+      <p:sp>
+        <p:nvSpPr>
+          <p:cNvPr id="81" name="Tekstfelt 80">
+            <a:extLst>
+              <a:ext uri="{FF2B5EF4-FFF2-40B4-BE49-F238E27FC236}">
+                <a16:creationId xmlns:a16="http://schemas.microsoft.com/office/drawing/2014/main" id="{EE09E0AF-C7AF-4E70-84A5-FAA89E1DD520}"/>
+              </a:ext>
+            </a:extLst>
+          </p:cNvPr>
+          <p:cNvSpPr txBox="1"/>
+          <p:nvPr/>
+        </p:nvSpPr>
+        <p:spPr>
+          <a:xfrm>
+            <a:off x="24717051" y="31620106"/>
+            <a:ext cx="2706906" cy="369332"/>
+          </a:xfrm>
+          <a:prstGeom prst="rect">
+            <a:avLst/>
+          </a:prstGeom>
+          <a:noFill/>
+        </p:spPr>
+        <p:txBody>
+          <a:bodyPr wrap="square" rtlCol="0">
+            <a:spAutoFit/>
+          </a:bodyPr>
+          <a:lstStyle/>
+          <a:p>
+            <a:pPr algn="ctr"/>
+            <a:r>
+              <a:rPr lang="en-US" dirty="0">
+                <a:solidFill>
+                  <a:srgbClr val="FF0000"/>
+                </a:solidFill>
+              </a:rPr>
+              <a:t>ISR_WHEEL(1)</a:t>
+            </a:r>
+            <a:endParaRPr lang="da-DK" dirty="0">
+              <a:solidFill>
+                <a:srgbClr val="FF0000"/>
+              </a:solidFill>
+            </a:endParaRPr>
+          </a:p>
+        </p:txBody>
+      </p:sp>
+      <p:sp>
+        <p:nvSpPr>
+          <p:cNvPr id="82" name="Tekstfelt 81">
+            <a:extLst>
+              <a:ext uri="{FF2B5EF4-FFF2-40B4-BE49-F238E27FC236}">
+                <a16:creationId xmlns:a16="http://schemas.microsoft.com/office/drawing/2014/main" id="{061B7428-803C-4877-AC5F-F401A37CF9AC}"/>
+              </a:ext>
+            </a:extLst>
+          </p:cNvPr>
+          <p:cNvSpPr txBox="1"/>
+          <p:nvPr/>
+        </p:nvSpPr>
+        <p:spPr>
+          <a:xfrm>
+            <a:off x="25705604" y="32133613"/>
+            <a:ext cx="2778492" cy="369332"/>
+          </a:xfrm>
+          <a:prstGeom prst="rect">
+            <a:avLst/>
+          </a:prstGeom>
+          <a:noFill/>
+        </p:spPr>
+        <p:txBody>
+          <a:bodyPr wrap="square" rtlCol="0">
+            <a:spAutoFit/>
+          </a:bodyPr>
+          <a:lstStyle/>
+          <a:p>
+            <a:pPr algn="ctr"/>
+            <a:r>
+              <a:rPr lang="en-US" dirty="0">
+                <a:solidFill>
+                  <a:srgbClr val="FF0000"/>
+                </a:solidFill>
+              </a:rPr>
+              <a:t>Increment distance count</a:t>
+            </a:r>
+            <a:endParaRPr lang="da-DK" dirty="0">
+              <a:solidFill>
+                <a:srgbClr val="FF0000"/>
+              </a:solidFill>
+            </a:endParaRPr>
+          </a:p>
+        </p:txBody>
+      </p:sp>
+      <p:sp>
+        <p:nvSpPr>
+          <p:cNvPr id="83" name="Tekstfelt 82">
+            <a:extLst>
+              <a:ext uri="{FF2B5EF4-FFF2-40B4-BE49-F238E27FC236}">
+                <a16:creationId xmlns:a16="http://schemas.microsoft.com/office/drawing/2014/main" id="{A7AB05AF-B5B3-4B55-8614-C18C3F35BD4B}"/>
+              </a:ext>
+            </a:extLst>
+          </p:cNvPr>
+          <p:cNvSpPr txBox="1"/>
+          <p:nvPr/>
+        </p:nvSpPr>
+        <p:spPr>
+          <a:xfrm>
+            <a:off x="22427624" y="31810447"/>
+            <a:ext cx="2778492" cy="646331"/>
+          </a:xfrm>
+          <a:prstGeom prst="rect">
+            <a:avLst/>
+          </a:prstGeom>
+          <a:noFill/>
+        </p:spPr>
+        <p:txBody>
+          <a:bodyPr wrap="square" rtlCol="0">
+            <a:spAutoFit/>
+          </a:bodyPr>
+          <a:lstStyle/>
+          <a:p>
+            <a:pPr algn="ctr"/>
+            <a:r>
+              <a:rPr lang="en-US" dirty="0"/>
+              <a:t>Input from wheel tachometer</a:t>
+            </a:r>
+            <a:endParaRPr lang="da-DK" dirty="0"/>
+          </a:p>
+        </p:txBody>
+      </p:sp>
+      <p:sp>
+        <p:nvSpPr>
+          <p:cNvPr id="84" name="Tekstfelt 83">
+            <a:extLst>
+              <a:ext uri="{FF2B5EF4-FFF2-40B4-BE49-F238E27FC236}">
+                <a16:creationId xmlns:a16="http://schemas.microsoft.com/office/drawing/2014/main" id="{FB530085-6FCA-4C2A-9EAD-220BAB047DD9}"/>
+              </a:ext>
+            </a:extLst>
+          </p:cNvPr>
+          <p:cNvSpPr txBox="1"/>
+          <p:nvPr/>
+        </p:nvSpPr>
+        <p:spPr>
+          <a:xfrm>
+            <a:off x="24790094" y="32720811"/>
+            <a:ext cx="2706906" cy="369332"/>
+          </a:xfrm>
+          <a:prstGeom prst="rect">
+            <a:avLst/>
+          </a:prstGeom>
+          <a:noFill/>
+        </p:spPr>
+        <p:txBody>
+          <a:bodyPr wrap="square" rtlCol="0">
+            <a:spAutoFit/>
+          </a:bodyPr>
+          <a:lstStyle/>
+          <a:p>
+            <a:pPr algn="ctr"/>
+            <a:r>
+              <a:rPr lang="en-US" dirty="0" err="1"/>
+              <a:t>ioTimerCallback</a:t>
+            </a:r>
+            <a:r>
+              <a:rPr lang="en-US" dirty="0"/>
+              <a:t>()</a:t>
+            </a:r>
+            <a:endParaRPr lang="da-DK" dirty="0"/>
+          </a:p>
+        </p:txBody>
+      </p:sp>
+      <p:sp>
+        <p:nvSpPr>
+          <p:cNvPr id="85" name="Tekstfelt 84">
+            <a:extLst>
+              <a:ext uri="{FF2B5EF4-FFF2-40B4-BE49-F238E27FC236}">
+                <a16:creationId xmlns:a16="http://schemas.microsoft.com/office/drawing/2014/main" id="{04C479EC-5DB0-4A53-A64C-16F2317CA44E}"/>
+              </a:ext>
+            </a:extLst>
+          </p:cNvPr>
+          <p:cNvSpPr txBox="1"/>
+          <p:nvPr/>
+        </p:nvSpPr>
+        <p:spPr>
+          <a:xfrm>
+            <a:off x="25585962" y="33069558"/>
+            <a:ext cx="2875505" cy="923330"/>
+          </a:xfrm>
+          <a:prstGeom prst="rect">
+            <a:avLst/>
+          </a:prstGeom>
+          <a:noFill/>
+        </p:spPr>
+        <p:txBody>
+          <a:bodyPr wrap="square" rtlCol="0">
+            <a:spAutoFit/>
+          </a:bodyPr>
+          <a:lstStyle/>
+          <a:p>
+            <a:pPr algn="ctr"/>
+            <a:r>
+              <a:rPr lang="en-US" dirty="0"/>
+              <a:t>- Calculate distance</a:t>
+            </a:r>
+          </a:p>
+          <a:p>
+            <a:pPr algn="ctr"/>
+            <a:r>
+              <a:rPr lang="en-US" dirty="0"/>
+              <a:t>- Filter noise from tachometer</a:t>
+            </a:r>
+          </a:p>
+        </p:txBody>
+      </p:sp>
+      <p:sp>
+        <p:nvSpPr>
+          <p:cNvPr id="86" name="Tekstfelt 85">
+            <a:extLst>
+              <a:ext uri="{FF2B5EF4-FFF2-40B4-BE49-F238E27FC236}">
+                <a16:creationId xmlns:a16="http://schemas.microsoft.com/office/drawing/2014/main" id="{2E2F7C98-2EEE-4790-8E51-CC43391FA8BF}"/>
+              </a:ext>
+            </a:extLst>
+          </p:cNvPr>
+          <p:cNvSpPr txBox="1"/>
+          <p:nvPr/>
+        </p:nvSpPr>
+        <p:spPr>
+          <a:xfrm>
+            <a:off x="26635306" y="34486183"/>
+            <a:ext cx="1723387" cy="646331"/>
+          </a:xfrm>
+          <a:prstGeom prst="rect">
+            <a:avLst/>
+          </a:prstGeom>
+          <a:noFill/>
+        </p:spPr>
+        <p:txBody>
+          <a:bodyPr wrap="square" rtlCol="0">
+            <a:spAutoFit/>
+          </a:bodyPr>
+          <a:lstStyle/>
+          <a:p>
+            <a:pPr algn="ctr"/>
+            <a:r>
+              <a:rPr lang="en-US" dirty="0">
+                <a:solidFill>
+                  <a:srgbClr val="FF0000"/>
+                </a:solidFill>
+              </a:rPr>
+              <a:t>Play next tone in song</a:t>
+            </a:r>
+          </a:p>
+        </p:txBody>
+      </p:sp>
+      <p:sp>
+        <p:nvSpPr>
+          <p:cNvPr id="87" name="Tekstfelt 86">
+            <a:extLst>
+              <a:ext uri="{FF2B5EF4-FFF2-40B4-BE49-F238E27FC236}">
+                <a16:creationId xmlns:a16="http://schemas.microsoft.com/office/drawing/2014/main" id="{1B4AC5B8-549B-4EC4-9C2E-55AB8B4258DE}"/>
+              </a:ext>
+            </a:extLst>
+          </p:cNvPr>
+          <p:cNvSpPr txBox="1"/>
+          <p:nvPr/>
+        </p:nvSpPr>
+        <p:spPr>
+          <a:xfrm>
+            <a:off x="25431848" y="34059619"/>
+            <a:ext cx="2706906" cy="369332"/>
+          </a:xfrm>
+          <a:prstGeom prst="rect">
+            <a:avLst/>
+          </a:prstGeom>
+          <a:noFill/>
+        </p:spPr>
+        <p:txBody>
+          <a:bodyPr wrap="square" rtlCol="0">
+            <a:spAutoFit/>
+          </a:bodyPr>
+          <a:lstStyle/>
+          <a:p>
+            <a:pPr algn="ctr"/>
+            <a:r>
+              <a:rPr lang="en-US" dirty="0" err="1">
+                <a:solidFill>
+                  <a:srgbClr val="FF0000"/>
+                </a:solidFill>
+              </a:rPr>
+              <a:t>tunesTimer</a:t>
+            </a:r>
+            <a:r>
+              <a:rPr lang="en-US" dirty="0">
+                <a:solidFill>
+                  <a:srgbClr val="FF0000"/>
+                </a:solidFill>
+              </a:rPr>
+              <a:t>()</a:t>
+            </a:r>
+            <a:endParaRPr lang="da-DK" dirty="0">
+              <a:solidFill>
+                <a:srgbClr val="FF0000"/>
+              </a:solidFill>
+            </a:endParaRPr>
+          </a:p>
+        </p:txBody>
+      </p:sp>
+      <p:sp>
+        <p:nvSpPr>
+          <p:cNvPr id="88" name="Tekstfelt 87">
+            <a:extLst>
+              <a:ext uri="{FF2B5EF4-FFF2-40B4-BE49-F238E27FC236}">
+                <a16:creationId xmlns:a16="http://schemas.microsoft.com/office/drawing/2014/main" id="{10DB749D-1180-4CC0-A22A-4CC0FBEDE1FE}"/>
+              </a:ext>
+            </a:extLst>
+          </p:cNvPr>
+          <p:cNvSpPr txBox="1"/>
+          <p:nvPr/>
+        </p:nvSpPr>
+        <p:spPr>
+          <a:xfrm>
+            <a:off x="22316070" y="32885017"/>
+            <a:ext cx="3050014" cy="369332"/>
+          </a:xfrm>
+          <a:prstGeom prst="rect">
+            <a:avLst/>
+          </a:prstGeom>
+          <a:noFill/>
+        </p:spPr>
+        <p:txBody>
+          <a:bodyPr wrap="square" rtlCol="0">
+            <a:spAutoFit/>
+          </a:bodyPr>
+          <a:lstStyle/>
+          <a:p>
+            <a:pPr algn="ctr"/>
+            <a:r>
+              <a:rPr lang="en-US" dirty="0"/>
+              <a:t>10ms has passed</a:t>
+            </a:r>
+            <a:endParaRPr lang="da-DK" dirty="0"/>
+          </a:p>
+        </p:txBody>
+      </p:sp>
+      <p:sp>
+        <p:nvSpPr>
+          <p:cNvPr id="89" name="Tekstfelt 88">
+            <a:extLst>
+              <a:ext uri="{FF2B5EF4-FFF2-40B4-BE49-F238E27FC236}">
+                <a16:creationId xmlns:a16="http://schemas.microsoft.com/office/drawing/2014/main" id="{B7838FC1-49E1-4B20-87CF-CC6889AE8ED2}"/>
+              </a:ext>
+            </a:extLst>
+          </p:cNvPr>
+          <p:cNvSpPr txBox="1"/>
+          <p:nvPr/>
+        </p:nvSpPr>
+        <p:spPr>
+          <a:xfrm>
+            <a:off x="22535948" y="34311228"/>
+            <a:ext cx="3050014" cy="646331"/>
+          </a:xfrm>
+          <a:prstGeom prst="rect">
+            <a:avLst/>
+          </a:prstGeom>
+          <a:noFill/>
+        </p:spPr>
+        <p:txBody>
+          <a:bodyPr wrap="square" rtlCol="0">
+            <a:spAutoFit/>
+          </a:bodyPr>
+          <a:lstStyle/>
+          <a:p>
+            <a:pPr algn="ctr"/>
+            <a:r>
+              <a:rPr lang="en-US" dirty="0"/>
+              <a:t>Sing has been called and 10ms has passed</a:t>
+            </a:r>
+            <a:endParaRPr lang="da-DK" dirty="0"/>
+          </a:p>
+        </p:txBody>
+      </p:sp>
     </p:spTree>
   </p:cSld>
   <p:clrMapOvr>

</xml_diff>

<commit_message>
Udkast til færdig version
</commit_message>
<xml_diff>
--- a/Poster.pptx
+++ b/Poster.pptx
@@ -10836,7 +10836,7 @@
         <p:spPr bwMode="auto">
           <a:xfrm>
             <a:off x="1457504" y="18737295"/>
-            <a:ext cx="6297612" cy="12876687"/>
+            <a:ext cx="6581576" cy="10050186"/>
           </a:xfrm>
           <a:prstGeom prst="rect">
             <a:avLst/>
@@ -11037,17 +11037,28 @@
                   <a:srgbClr val="C00000"/>
                 </a:solidFill>
               </a:rPr>
-              <a:t>Introduction</a:t>
+              <a:t>Injection</a:t>
+            </a:r>
+            <a:r>
+              <a:rPr lang="da-DK" altLang="en-DK" sz="4500" dirty="0">
+                <a:solidFill>
+                  <a:srgbClr val="C00000"/>
+                </a:solidFill>
+              </a:rPr>
+              <a:t> and </a:t>
+            </a:r>
+            <a:r>
+              <a:rPr lang="da-DK" altLang="en-DK" sz="4500" dirty="0" err="1">
+                <a:solidFill>
+                  <a:srgbClr val="C00000"/>
+                </a:solidFill>
+              </a:rPr>
+              <a:t>Ignition</a:t>
             </a:r>
             <a:r>
               <a:rPr lang="da-DK" altLang="en-DK" sz="3500" dirty="0"/>
               <a:t> </a:t>
             </a:r>
-            <a:endParaRPr lang="da-DK" altLang="en-DK" sz="3500" b="0" dirty="0">
-              <a:solidFill>
-                <a:schemeClr val="tx1"/>
-              </a:solidFill>
-            </a:endParaRPr>
           </a:p>
           <a:p>
             <a:pPr>
@@ -11061,7 +11072,75 @@
                   <a:schemeClr val="tx1"/>
                 </a:solidFill>
               </a:rPr>
-              <a:t>The DTU Roadrunner team is seeking to replace an important motor control component in the ecocar. </a:t>
+              <a:t>The injection and ignition of fuel is the most time critical aspect of the car, since they have to be timed very precisely with a high resolution, regardless of the motor's RPM. In figure 1 a representation of a motor cycle, as read on the encoder can be seen, the numbers refer to the following</a:t>
+            </a:r>
+          </a:p>
+          <a:p>
+            <a:pPr marL="514350" indent="-514350">
+              <a:lnSpc>
+                <a:spcPts val="4500"/>
+              </a:lnSpc>
+              <a:buFont typeface="+mj-lt"/>
+              <a:buAutoNum type="arabicPeriod"/>
+            </a:pPr>
+            <a:r>
+              <a:rPr lang="en-US" altLang="en-DK" sz="3500" b="0" dirty="0">
+                <a:solidFill>
+                  <a:schemeClr val="tx1"/>
+                </a:solidFill>
+              </a:rPr>
+              <a:t>Start of fuel injection. </a:t>
+            </a:r>
+          </a:p>
+          <a:p>
+            <a:pPr marL="514350" indent="-514350">
+              <a:lnSpc>
+                <a:spcPts val="4500"/>
+              </a:lnSpc>
+              <a:buFont typeface="+mj-lt"/>
+              <a:buAutoNum type="arabicPeriod"/>
+            </a:pPr>
+            <a:r>
+              <a:rPr lang="en-US" altLang="en-DK" sz="3500" b="0" dirty="0">
+                <a:solidFill>
+                  <a:schemeClr val="tx1"/>
+                </a:solidFill>
+              </a:rPr>
+              <a:t>Stopping fuel injection. </a:t>
+            </a:r>
+          </a:p>
+          <a:p>
+            <a:pPr marL="514350" indent="-514350">
+              <a:lnSpc>
+                <a:spcPts val="4500"/>
+              </a:lnSpc>
+              <a:buFont typeface="+mj-lt"/>
+              <a:buAutoNum type="arabicPeriod"/>
+            </a:pPr>
+            <a:r>
+              <a:rPr lang="en-US" altLang="en-DK" sz="3500" b="0" dirty="0">
+                <a:solidFill>
+                  <a:schemeClr val="tx1"/>
+                </a:solidFill>
+              </a:rPr>
+              <a:t>Ignition coil begins to charge.</a:t>
+            </a:r>
+          </a:p>
+          <a:p>
+            <a:pPr marL="514350" indent="-514350">
+              <a:lnSpc>
+                <a:spcPts val="4500"/>
+              </a:lnSpc>
+              <a:buFont typeface="+mj-lt"/>
+              <a:buAutoNum type="arabicPeriod"/>
+            </a:pPr>
+            <a:r>
+              <a:rPr lang="en-US" altLang="en-DK" sz="3500" b="0" dirty="0">
+                <a:solidFill>
+                  <a:schemeClr val="tx1"/>
+                </a:solidFill>
+              </a:rPr>
+              <a:t>Ignition coil discharges, giving a spark and igniting the fuel.</a:t>
             </a:r>
           </a:p>
           <a:p>
@@ -11076,38 +11155,7 @@
                   <a:schemeClr val="tx1"/>
                 </a:solidFill>
               </a:rPr>
-              <a:t>DTU roadrunners is participating in the Shell Eco marathon, and due to a rule change, power consumption is now counted to determine the fuel efficiency of the car.</a:t>
-            </a:r>
-          </a:p>
-          <a:p>
-            <a:pPr>
-              <a:lnSpc>
-                <a:spcPts val="4500"/>
-              </a:lnSpc>
-            </a:pPr>
-            <a:r>
-              <a:rPr lang="en-US" altLang="en-DK" sz="3500" b="0" dirty="0">
-                <a:solidFill>
-                  <a:schemeClr val="tx1"/>
-                </a:solidFill>
-              </a:rPr>
-              <a:t>Combining this with a goal to reduce the overall weight of the car, this project focuses on replacing a very power consuming component, the National </a:t>
-            </a:r>
-            <a:r>
-              <a:rPr lang="en-US" altLang="en-DK" sz="3500" b="0" dirty="0" err="1">
-                <a:solidFill>
-                  <a:schemeClr val="tx1"/>
-                </a:solidFill>
-              </a:rPr>
-              <a:t>Instrumets</a:t>
-            </a:r>
-            <a:r>
-              <a:rPr lang="en-US" altLang="en-DK" sz="3500" b="0" dirty="0">
-                <a:solidFill>
-                  <a:schemeClr val="tx1"/>
-                </a:solidFill>
-              </a:rPr>
-              <a:t> Reconfigurable I/O (RIO), with our own integrated electronics.</a:t>
+              <a:t>Note that the Z-pulse is placed at an arbitrary angle.</a:t>
             </a:r>
           </a:p>
         </p:txBody>
@@ -11612,7 +11660,7 @@
                   <a:schemeClr val="tx1"/>
                 </a:solidFill>
               </a:rPr>
-              <a:t>The main power saving is done by the replacement itself, as the integrated electronics is very barebone and therefore does no unneeded operations. A comparison between the current usage of the two systems can be seen on figure 1</a:t>
+              <a:t>The main power saving is done by the replacement itself, as the integrated electronics is very barebone and therefore does no unneeded operations. A comparison between the current usage of the two systems can be seen on figure 2</a:t>
             </a:r>
             <a:endParaRPr lang="da-DK" altLang="en-DK" sz="3500" b="0" dirty="0">
               <a:solidFill>
@@ -11638,7 +11686,7 @@
         </p:nvSpPr>
         <p:spPr bwMode="auto">
           <a:xfrm>
-            <a:off x="1489642" y="37775198"/>
+            <a:off x="1517721" y="35328257"/>
             <a:ext cx="6297613" cy="949325"/>
           </a:xfrm>
           <a:prstGeom prst="rect">
@@ -11688,32 +11736,20 @@
               </a:lnSpc>
             </a:pPr>
             <a:r>
+              <a:rPr lang="da-DK" altLang="en-DK" sz="1500" dirty="0" err="1"/>
+              <a:t>Figure</a:t>
+            </a:r>
+            <a:r>
               <a:rPr lang="da-DK" altLang="en-DK" sz="1500" dirty="0"/>
-              <a:t>Billedtekst </a:t>
-            </a:r>
-            <a:r>
-              <a:rPr lang="da-DK" altLang="en-DK" sz="1500" dirty="0">
-                <a:solidFill>
-                  <a:srgbClr val="BD2A33"/>
-                </a:solidFill>
-              </a:rPr>
-              <a:t>(Arial </a:t>
-            </a:r>
-            <a:r>
-              <a:rPr lang="da-DK" altLang="en-DK" sz="1500" dirty="0" err="1">
-                <a:solidFill>
-                  <a:srgbClr val="BD2A33"/>
-                </a:solidFill>
-              </a:rPr>
-              <a:t>Regular</a:t>
-            </a:r>
-            <a:r>
-              <a:rPr lang="da-DK" altLang="en-DK" sz="1500" dirty="0">
-                <a:solidFill>
-                  <a:srgbClr val="BD2A33"/>
-                </a:solidFill>
-              </a:rPr>
-              <a:t> 15/24Pt.)</a:t>
+              <a:t> 1: </a:t>
+            </a:r>
+            <a:r>
+              <a:rPr lang="en-US" altLang="en-DK" sz="1500" dirty="0">
+                <a:solidFill>
+                  <a:srgbClr val="C00000"/>
+                </a:solidFill>
+              </a:rPr>
+              <a:t>A representation of a motor cycle, as read on the encoder. </a:t>
             </a:r>
           </a:p>
         </p:txBody>
@@ -12166,7 +12202,7 @@
             </a:pPr>
             <a:r>
               <a:rPr lang="da-DK" altLang="en-DK" sz="1500" dirty="0"/>
-              <a:t>Figur 1</a:t>
+              <a:t>Figur 2</a:t>
             </a:r>
             <a:r>
               <a:rPr lang="da-DK" altLang="en-DK" sz="1500" dirty="0">
@@ -15038,6 +15074,42 @@
           </a:p>
         </p:txBody>
       </p:sp>
+      <p:pic>
+        <p:nvPicPr>
+          <p:cNvPr id="22" name="Billede 21">
+            <a:extLst>
+              <a:ext uri="{FF2B5EF4-FFF2-40B4-BE49-F238E27FC236}">
+                <a16:creationId xmlns:a16="http://schemas.microsoft.com/office/drawing/2014/main" id="{59A93F44-8957-4131-887A-EB7F39E15E40}"/>
+              </a:ext>
+            </a:extLst>
+          </p:cNvPr>
+          <p:cNvPicPr>
+            <a:picLocks noChangeAspect="1"/>
+          </p:cNvPicPr>
+          <p:nvPr/>
+        </p:nvPicPr>
+        <p:blipFill>
+          <a:blip r:embed="rId10">
+            <a:extLst>
+              <a:ext uri="{28A0092B-C50C-407E-A947-70E740481C1C}">
+                <a14:useLocalDpi xmlns:a14="http://schemas.microsoft.com/office/drawing/2010/main" val="0"/>
+              </a:ext>
+            </a:extLst>
+          </a:blip>
+          <a:stretch>
+            <a:fillRect/>
+          </a:stretch>
+        </p:blipFill>
+        <p:spPr>
+          <a:xfrm>
+            <a:off x="1389250" y="29077701"/>
+            <a:ext cx="6643291" cy="5960335"/>
+          </a:xfrm>
+          <a:prstGeom prst="rect">
+            <a:avLst/>
+          </a:prstGeom>
+        </p:spPr>
+      </p:pic>
     </p:spTree>
   </p:cSld>
   <p:clrMapOvr>

</xml_diff>

<commit_message>
Updated poster and created PDF
</commit_message>
<xml_diff>
--- a/Poster.pptx
+++ b/Poster.pptx
@@ -159,10 +159,6 @@
 </p:presentation>
 </file>
 
-<file path=ppt/revisionInfo.xml><?xml version="1.0" encoding="utf-8"?>
-<p1510:revInfo xmlns:a="http://schemas.openxmlformats.org/drawingml/2006/main" xmlns:r="http://schemas.openxmlformats.org/officeDocument/2006/relationships" xmlns:p1510="http://schemas.microsoft.com/office/powerpoint/2015/10/main"/>
-</file>
-
 <file path=ppt/handoutMasters/handoutMaster1.xml><?xml version="1.0" encoding="utf-8"?>
 <p:handoutMaster xmlns:a="http://schemas.openxmlformats.org/drawingml/2006/main" xmlns:r="http://schemas.openxmlformats.org/officeDocument/2006/relationships" xmlns:p="http://schemas.openxmlformats.org/presentationml/2006/main">
   <p:cSld>
@@ -258,7 +254,7 @@
             </a:lvl1pPr>
           </a:lstStyle>
           <a:p>
-            <a:endParaRPr lang="da-DK" altLang="en-DK"/>
+            <a:endParaRPr lang="da-DK" altLang="en-DK" dirty="0"/>
           </a:p>
         </p:txBody>
       </p:sp>
@@ -332,7 +328,7 @@
             </a:lvl1pPr>
           </a:lstStyle>
           <a:p>
-            <a:endParaRPr lang="da-DK" altLang="en-DK"/>
+            <a:endParaRPr lang="da-DK" altLang="en-DK" dirty="0"/>
           </a:p>
         </p:txBody>
       </p:sp>
@@ -406,7 +402,7 @@
             </a:lvl1pPr>
           </a:lstStyle>
           <a:p>
-            <a:endParaRPr lang="da-DK" altLang="en-DK"/>
+            <a:endParaRPr lang="da-DK" altLang="en-DK" dirty="0"/>
           </a:p>
         </p:txBody>
       </p:sp>
@@ -485,7 +481,7 @@
               <a:pPr/>
               <a:t>‹nr.›</a:t>
             </a:fld>
-            <a:endParaRPr lang="da-DK" altLang="en-DK"/>
+            <a:endParaRPr lang="da-DK" altLang="en-DK" dirty="0"/>
           </a:p>
         </p:txBody>
       </p:sp>
@@ -590,7 +586,7 @@
             </a:lvl1pPr>
           </a:lstStyle>
           <a:p>
-            <a:endParaRPr lang="da-DK" altLang="en-DK"/>
+            <a:endParaRPr lang="da-DK" altLang="en-DK" dirty="0"/>
           </a:p>
         </p:txBody>
       </p:sp>
@@ -664,7 +660,7 @@
             </a:lvl1pPr>
           </a:lstStyle>
           <a:p>
-            <a:endParaRPr lang="da-DK" altLang="en-DK"/>
+            <a:endParaRPr lang="da-DK" altLang="en-DK" dirty="0"/>
           </a:p>
         </p:txBody>
       </p:sp>
@@ -890,7 +886,7 @@
             </a:lvl1pPr>
           </a:lstStyle>
           <a:p>
-            <a:endParaRPr lang="da-DK" altLang="en-DK"/>
+            <a:endParaRPr lang="da-DK" altLang="en-DK" dirty="0"/>
           </a:p>
         </p:txBody>
       </p:sp>
@@ -969,7 +965,7 @@
               <a:pPr/>
               <a:t>‹nr.›</a:t>
             </a:fld>
-            <a:endParaRPr lang="da-DK" altLang="en-DK"/>
+            <a:endParaRPr lang="da-DK" altLang="en-DK" dirty="0"/>
           </a:p>
         </p:txBody>
       </p:sp>
@@ -2695,7 +2691,7 @@
           </a:lstStyle>
           <a:p>
             <a:r>
-              <a:rPr lang="en-US"/>
+              <a:rPr lang="en-US" dirty="0"/>
               <a:t>Click icon to add picture</a:t>
             </a:r>
             <a:endParaRPr lang="en-DK"/>
@@ -3478,7 +3474,7 @@
         </p:nvSpPr>
         <p:spPr bwMode="auto">
           <a:xfrm>
-            <a:off x="738188" y="4318072"/>
+            <a:off x="733425" y="4338366"/>
             <a:ext cx="28827412" cy="34609016"/>
           </a:xfrm>
           <a:prstGeom prst="rect">
@@ -3684,37 +3680,90 @@
           </a:extLst>
         </p:spPr>
       </p:pic>
-      <p:pic>
-        <p:nvPicPr>
-          <p:cNvPr id="38932" name="Picture 20">
-            <a:extLst>
-              <a:ext uri="{FF2B5EF4-FFF2-40B4-BE49-F238E27FC236}">
-                <a16:creationId xmlns:a16="http://schemas.microsoft.com/office/drawing/2014/main" id="{6C1C31CB-5E27-410F-AD3E-53C4DF31C9C0}"/>
-              </a:ext>
-            </a:extLst>
-          </p:cNvPr>
-          <p:cNvPicPr>
-            <a:picLocks noChangeAspect="1" noChangeArrowheads="1"/>
-          </p:cNvPicPr>
+      <p:sp>
+        <p:nvSpPr>
+          <p:cNvPr id="38915" name="Rectangle 3">
+            <a:extLst>
+              <a:ext uri="{FF2B5EF4-FFF2-40B4-BE49-F238E27FC236}">
+                <a16:creationId xmlns:a16="http://schemas.microsoft.com/office/drawing/2014/main" id="{2FBF4633-5974-42ED-9967-CB121A8A9E69}"/>
+              </a:ext>
+            </a:extLst>
+          </p:cNvPr>
+          <p:cNvSpPr>
+            <a:spLocks noGrp="1" noChangeArrowheads="1"/>
+          </p:cNvSpPr>
+          <p:nvPr>
+            <p:ph type="title"/>
+          </p:nvPr>
+        </p:nvSpPr>
+        <p:spPr>
+          <a:xfrm>
+            <a:off x="1391362" y="4211315"/>
+            <a:ext cx="27382788" cy="4752975"/>
+          </a:xfrm>
+        </p:spPr>
+        <p:txBody>
+          <a:bodyPr/>
+          <a:lstStyle/>
+          <a:p>
+            <a:pPr>
+              <a:lnSpc>
+                <a:spcPct val="100000"/>
+              </a:lnSpc>
+            </a:pPr>
+            <a:r>
+              <a:rPr lang="en-US" altLang="en-DK" sz="13300" dirty="0">
+                <a:solidFill>
+                  <a:srgbClr val="C00000"/>
+                </a:solidFill>
+              </a:rPr>
+              <a:t>Lowering Energy Consumption</a:t>
+            </a:r>
+            <a:br>
+              <a:rPr lang="en-US" altLang="en-DK" sz="14400" dirty="0">
+                <a:solidFill>
+                  <a:srgbClr val="C00000"/>
+                </a:solidFill>
+              </a:rPr>
+            </a:br>
+            <a:r>
+              <a:rPr lang="en-US" altLang="en-DK" sz="8000" dirty="0">
+                <a:solidFill>
+                  <a:schemeClr val="bg1">
+                    <a:lumMod val="65000"/>
+                  </a:schemeClr>
+                </a:solidFill>
+              </a:rPr>
+              <a:t>by Implementing a Custom Engine Control Unit in Place of a General Purpose Controller</a:t>
+            </a:r>
+            <a:endParaRPr lang="en-US" altLang="en-DK" sz="13800" dirty="0">
+              <a:solidFill>
+                <a:schemeClr val="bg1">
+                  <a:lumMod val="65000"/>
+                </a:schemeClr>
+              </a:solidFill>
+            </a:endParaRPr>
+          </a:p>
+        </p:txBody>
+      </p:sp>
+      <p:sp>
+        <p:nvSpPr>
+          <p:cNvPr id="38917" name="Text Box 5">
+            <a:extLst>
+              <a:ext uri="{FF2B5EF4-FFF2-40B4-BE49-F238E27FC236}">
+                <a16:creationId xmlns:a16="http://schemas.microsoft.com/office/drawing/2014/main" id="{DC1E96C4-1476-4B4D-AAE9-6700386170AD}"/>
+              </a:ext>
+            </a:extLst>
+          </p:cNvPr>
+          <p:cNvSpPr txBox="1">
+            <a:spLocks noChangeArrowheads="1"/>
+          </p:cNvSpPr>
           <p:nvPr/>
-        </p:nvPicPr>
-        <p:blipFill>
-          <a:blip r:embed="rId3">
-            <a:extLst>
-              <a:ext uri="{28A0092B-C50C-407E-A947-70E740481C1C}">
-                <a14:useLocalDpi xmlns:a14="http://schemas.microsoft.com/office/drawing/2010/main" val="0"/>
-              </a:ext>
-            </a:extLst>
-          </a:blip>
-          <a:srcRect l="31387" t="8533" r="29947" b="4248"/>
-          <a:stretch>
-            <a:fillRect/>
-          </a:stretch>
-        </p:blipFill>
+        </p:nvSpPr>
         <p:spPr bwMode="auto">
           <a:xfrm>
-            <a:off x="32317531" y="122149"/>
-            <a:ext cx="14395450" cy="20294600"/>
+            <a:off x="1434456" y="8594349"/>
+            <a:ext cx="27384375" cy="1347787"/>
           </a:xfrm>
           <a:prstGeom prst="rect">
             <a:avLst/>
@@ -3753,173 +3802,6 @@
             </a:ext>
           </a:extLst>
         </p:spPr>
-      </p:pic>
-      <p:sp>
-        <p:nvSpPr>
-          <p:cNvPr id="38915" name="Rectangle 3">
-            <a:extLst>
-              <a:ext uri="{FF2B5EF4-FFF2-40B4-BE49-F238E27FC236}">
-                <a16:creationId xmlns:a16="http://schemas.microsoft.com/office/drawing/2014/main" id="{2FBF4633-5974-42ED-9967-CB121A8A9E69}"/>
-              </a:ext>
-            </a:extLst>
-          </p:cNvPr>
-          <p:cNvSpPr>
-            <a:spLocks noGrp="1" noChangeArrowheads="1"/>
-          </p:cNvSpPr>
-          <p:nvPr>
-            <p:ph type="title"/>
-          </p:nvPr>
-        </p:nvSpPr>
-        <p:spPr/>
-        <p:txBody>
-          <a:bodyPr/>
-          <a:lstStyle/>
-          <a:p>
-            <a:r>
-              <a:rPr lang="da-DK" altLang="en-DK" sz="16000" dirty="0" err="1">
-                <a:solidFill>
-                  <a:srgbClr val="C00000"/>
-                </a:solidFill>
-              </a:rPr>
-              <a:t>Implementing</a:t>
-            </a:r>
-            <a:r>
-              <a:rPr lang="da-DK" altLang="en-DK" sz="16000" dirty="0">
-                <a:solidFill>
-                  <a:srgbClr val="C00000"/>
-                </a:solidFill>
-              </a:rPr>
-              <a:t> motor </a:t>
-            </a:r>
-            <a:r>
-              <a:rPr lang="da-DK" altLang="en-DK" sz="16000" dirty="0" err="1">
-                <a:solidFill>
-                  <a:srgbClr val="C00000"/>
-                </a:solidFill>
-              </a:rPr>
-              <a:t>control</a:t>
-            </a:r>
-            <a:r>
-              <a:rPr lang="da-DK" altLang="en-DK" sz="16000" dirty="0">
-                <a:solidFill>
-                  <a:srgbClr val="C00000"/>
-                </a:solidFill>
-              </a:rPr>
-              <a:t> </a:t>
-            </a:r>
-            <a:br>
-              <a:rPr lang="da-DK" altLang="en-DK" sz="14400" dirty="0">
-                <a:solidFill>
-                  <a:srgbClr val="C00000"/>
-                </a:solidFill>
-              </a:rPr>
-            </a:br>
-            <a:r>
-              <a:rPr lang="da-DK" altLang="en-DK" sz="13800" dirty="0">
-                <a:solidFill>
-                  <a:schemeClr val="bg1">
-                    <a:lumMod val="65000"/>
-                  </a:schemeClr>
-                </a:solidFill>
-              </a:rPr>
-              <a:t>with </a:t>
-            </a:r>
-            <a:r>
-              <a:rPr lang="da-DK" altLang="en-DK" sz="13800" dirty="0" err="1">
-                <a:solidFill>
-                  <a:schemeClr val="bg1">
-                    <a:lumMod val="65000"/>
-                  </a:schemeClr>
-                </a:solidFill>
-              </a:rPr>
-              <a:t>embedded</a:t>
-            </a:r>
-            <a:r>
-              <a:rPr lang="da-DK" altLang="en-DK" sz="13800" dirty="0">
-                <a:solidFill>
-                  <a:schemeClr val="bg1">
-                    <a:lumMod val="65000"/>
-                  </a:schemeClr>
-                </a:solidFill>
-              </a:rPr>
-              <a:t> </a:t>
-            </a:r>
-            <a:r>
-              <a:rPr lang="da-DK" altLang="en-DK" sz="13800" dirty="0" err="1">
-                <a:solidFill>
-                  <a:schemeClr val="bg1">
-                    <a:lumMod val="65000"/>
-                  </a:schemeClr>
-                </a:solidFill>
-              </a:rPr>
-              <a:t>electronics</a:t>
-            </a:r>
-            <a:endParaRPr lang="da-DK" altLang="en-DK" sz="13800" dirty="0">
-              <a:solidFill>
-                <a:schemeClr val="bg1">
-                  <a:lumMod val="65000"/>
-                </a:schemeClr>
-              </a:solidFill>
-            </a:endParaRPr>
-          </a:p>
-        </p:txBody>
-      </p:sp>
-      <p:sp>
-        <p:nvSpPr>
-          <p:cNvPr id="38917" name="Text Box 5">
-            <a:extLst>
-              <a:ext uri="{FF2B5EF4-FFF2-40B4-BE49-F238E27FC236}">
-                <a16:creationId xmlns:a16="http://schemas.microsoft.com/office/drawing/2014/main" id="{DC1E96C4-1476-4B4D-AAE9-6700386170AD}"/>
-              </a:ext>
-            </a:extLst>
-          </p:cNvPr>
-          <p:cNvSpPr txBox="1">
-            <a:spLocks noChangeArrowheads="1"/>
-          </p:cNvSpPr>
-          <p:nvPr/>
-        </p:nvSpPr>
-        <p:spPr bwMode="auto">
-          <a:xfrm>
-            <a:off x="1387209" y="8175155"/>
-            <a:ext cx="27384375" cy="1347787"/>
-          </a:xfrm>
-          <a:prstGeom prst="rect">
-            <a:avLst/>
-          </a:prstGeom>
-          <a:noFill/>
-          <a:ln>
-            <a:noFill/>
-          </a:ln>
-          <a:effectLst/>
-          <a:extLst>
-            <a:ext uri="{909E8E84-426E-40DD-AFC4-6F175D3DCCD1}">
-              <a14:hiddenFill xmlns:a14="http://schemas.microsoft.com/office/drawing/2010/main">
-                <a:solidFill>
-                  <a:schemeClr val="accent1"/>
-                </a:solidFill>
-              </a14:hiddenFill>
-            </a:ext>
-            <a:ext uri="{91240B29-F687-4F45-9708-019B960494DF}">
-              <a14:hiddenLine xmlns:a14="http://schemas.microsoft.com/office/drawing/2010/main" w="9525">
-                <a:solidFill>
-                  <a:schemeClr val="tx1"/>
-                </a:solidFill>
-                <a:miter lim="800000"/>
-                <a:headEnd/>
-                <a:tailEnd/>
-              </a14:hiddenLine>
-            </a:ext>
-            <a:ext uri="{AF507438-7753-43E0-B8FC-AC1667EBCBE1}">
-              <a14:hiddenEffects xmlns:a14="http://schemas.microsoft.com/office/drawing/2010/main">
-                <a:effectLst>
-                  <a:outerShdw dist="35921" dir="2700000" algn="ctr" rotWithShape="0">
-                    <a:schemeClr val="bg2"/>
-                  </a:outerShdw>
-                </a:effectLst>
-              </a14:hiddenEffects>
-            </a:ext>
-          </a:extLst>
-        </p:spPr>
         <p:txBody>
           <a:bodyPr lIns="0" tIns="0" rIns="0" bIns="0"/>
           <a:lstStyle/>
@@ -3931,19 +3813,7 @@
             </a:pPr>
             <a:r>
               <a:rPr lang="da-DK" altLang="en-DK" sz="6000" b="1" dirty="0"/>
-              <a:t>Group 01.03: Asger Kühl, Berk </a:t>
-            </a:r>
-            <a:r>
-              <a:rPr lang="da-DK" altLang="en-DK" sz="6000" b="1" dirty="0" err="1"/>
-              <a:t>Gezer</a:t>
-            </a:r>
-            <a:r>
-              <a:rPr lang="da-DK" altLang="en-DK" sz="6000" b="1" dirty="0"/>
-              <a:t>, Frederik Ettrup Larsen, Irene </a:t>
-            </a:r>
-            <a:r>
-              <a:rPr lang="da-DK" altLang="en-DK" sz="6000" b="1" dirty="0" err="1"/>
-              <a:t>Danvy</a:t>
+              <a:t>Group 01.03: Asger Kühl, Berk Gezer, Frederik Ettrup Larsen, Irene Danvy</a:t>
             </a:r>
             <a:endParaRPr lang="da-DK" altLang="en-DK" sz="6000" b="1" dirty="0">
               <a:solidFill>
@@ -4166,31 +4036,15 @@
               </a:lnSpc>
             </a:pPr>
             <a:r>
-              <a:rPr lang="da-DK" altLang="en-DK" sz="4500" dirty="0" err="1">
+              <a:rPr lang="en-US" altLang="en-DK" sz="4500" dirty="0">
                 <a:solidFill>
                   <a:srgbClr val="C00000"/>
                 </a:solidFill>
               </a:rPr>
-              <a:t>Injection</a:t>
-            </a:r>
-            <a:r>
-              <a:rPr lang="da-DK" altLang="en-DK" sz="4500" dirty="0">
-                <a:solidFill>
-                  <a:srgbClr val="C00000"/>
-                </a:solidFill>
-              </a:rPr>
-              <a:t> and </a:t>
-            </a:r>
-            <a:r>
-              <a:rPr lang="da-DK" altLang="en-DK" sz="4500" dirty="0" err="1">
-                <a:solidFill>
-                  <a:srgbClr val="C00000"/>
-                </a:solidFill>
-              </a:rPr>
-              <a:t>Ignition</a:t>
-            </a:r>
-            <a:r>
-              <a:rPr lang="da-DK" altLang="en-DK" sz="3500" dirty="0"/>
+              <a:t>Injection and Ignition</a:t>
+            </a:r>
+            <a:r>
+              <a:rPr lang="en-US" altLang="en-DK" sz="3500" dirty="0"/>
               <a:t> </a:t>
             </a:r>
           </a:p>
@@ -4206,7 +4060,7 @@
                   <a:schemeClr val="tx1"/>
                 </a:solidFill>
               </a:rPr>
-              <a:t>The injection and ignition of fuel is the most time critical aspect of the car. In figure 1 a representation of a motor cycle, as read on the encoder can be seen.</a:t>
+              <a:t>The most time critical aspect of the car is the injection and ignition of fuel. In figure 1 a representation of a motor cycle can be seen.</a:t>
             </a:r>
           </a:p>
         </p:txBody>
@@ -4228,7 +4082,7 @@
         <p:spPr bwMode="auto">
           <a:xfrm>
             <a:off x="1438275" y="9810974"/>
-            <a:ext cx="14345572" cy="5649913"/>
+            <a:ext cx="14345572" cy="7148577"/>
           </a:xfrm>
           <a:prstGeom prst="rect">
             <a:avLst/>
@@ -4435,32 +4289,8 @@
               <a:t> </a:t>
             </a:r>
             <a:r>
-              <a:rPr lang="en-US" altLang="en-DK" sz="3600" dirty="0"/>
-              <a:t>For the first time this year, the Shell </a:t>
-            </a:r>
-            <a:r>
-              <a:rPr lang="en-US" altLang="en-DK" sz="3600" dirty="0" err="1"/>
-              <a:t>EcoMarathon</a:t>
-            </a:r>
-            <a:r>
-              <a:rPr lang="en-US" altLang="en-DK" sz="3600" dirty="0"/>
-              <a:t> competition takes electrical energy used into account, an aspect of the DTU Roadrunners </a:t>
-            </a:r>
-            <a:r>
-              <a:rPr lang="en-US" altLang="en-DK" sz="3600" dirty="0" err="1"/>
-              <a:t>EcoCar</a:t>
-            </a:r>
-            <a:r>
-              <a:rPr lang="en-US" altLang="en-DK" sz="3600" dirty="0"/>
-              <a:t> which hasn't been optimized at all. Our approach to lowering the </a:t>
-            </a:r>
-            <a:r>
-              <a:rPr lang="en-US" altLang="en-DK" sz="3600" dirty="0" err="1"/>
-              <a:t>EcoCar's</a:t>
-            </a:r>
-            <a:r>
-              <a:rPr lang="en-US" altLang="en-DK" sz="3600" dirty="0"/>
-              <a:t> power consumption was to replace the current, power inefficient motor control with our own embedded electronics, using only one microcontroller, and removing no functionalities of the car. This resulted in our engine control unit (ECU), which uses less power while having the same functionality as the old motor control.</a:t>
+              <a:rPr lang="en-GB" altLang="en-DK" sz="3600" dirty="0"/>
+              <a:t>We replaced the generic engine control unit in the fuel efficient `EcoCar’ with special-purpose embedded electronics and lowered its energy consumption by two thirds, providing an extra 23.5 km/l in nominal conditions, when converting electrical energy to an equivalent amount of fuel. The component in the car which consistently consumes the most energy is the current engine control unit. In order to replace it, we used embedded electronics, which was made using only one microcontroller, and removed no functionalities of the car.</a:t>
             </a:r>
             <a:endParaRPr lang="da-DK" altLang="en-DK" sz="3600" dirty="0">
               <a:solidFill>
@@ -4488,8 +4318,8 @@
         </p:nvSpPr>
         <p:spPr>
           <a:xfrm>
-            <a:off x="8485820" y="24302526"/>
-            <a:ext cx="7281690" cy="5291956"/>
+            <a:off x="8485820" y="24302525"/>
+            <a:ext cx="7281690" cy="8521193"/>
           </a:xfrm>
           <a:noFill/>
           <a:ln/>
@@ -4504,28 +4334,12 @@
               </a:lnSpc>
             </a:pPr>
             <a:r>
-              <a:rPr lang="da-DK" altLang="en-DK" sz="4500" dirty="0">
+              <a:rPr lang="en-US" altLang="en-DK" sz="4500" dirty="0">
                 <a:solidFill>
                   <a:srgbClr val="C00000"/>
                 </a:solidFill>
               </a:rPr>
-              <a:t>Power </a:t>
-            </a:r>
-            <a:r>
-              <a:rPr lang="da-DK" altLang="en-DK" sz="4500" dirty="0" err="1">
-                <a:solidFill>
-                  <a:srgbClr val="C00000"/>
-                </a:solidFill>
-              </a:rPr>
-              <a:t>savings</a:t>
-            </a:r>
-            <a:r>
-              <a:rPr lang="da-DK" altLang="en-DK" sz="4500" dirty="0">
-                <a:solidFill>
-                  <a:srgbClr val="C00000"/>
-                </a:solidFill>
-              </a:rPr>
-              <a:t>  </a:t>
+              <a:t>Power savings  </a:t>
             </a:r>
           </a:p>
           <a:p>
@@ -4540,8 +4354,30 @@
                   <a:schemeClr val="tx1"/>
                 </a:solidFill>
               </a:rPr>
-              <a:t>The main power saving is done by the replacement itself, as the integrated electronics is very barebone and therefore does no unneeded operations. A comparison between the current usage of the two systems can be seen on figure 2</a:t>
-            </a:r>
+              <a:t>The main power saving is done by the replacement itself, as the embedded electronics is very optimized and therefore does not perform any unneeded operations. A comparison between the current going into the two systems can be seen on figure 2.</a:t>
+            </a:r>
+          </a:p>
+          <a:p>
+            <a:pPr>
+              <a:lnSpc>
+                <a:spcPts val="4500"/>
+              </a:lnSpc>
+            </a:pPr>
+            <a:r>
+              <a:rPr lang="en-US" altLang="en-DK" sz="3500" b="0" dirty="0">
+                <a:solidFill>
+                  <a:schemeClr val="tx1"/>
+                </a:solidFill>
+              </a:rPr>
+              <a:t>On average, the embedded system use 0.195A and the old system use 0.585A. This is a 66.67% decrease in electrical energy usage for the engine control.</a:t>
+            </a:r>
+          </a:p>
+          <a:p>
+            <a:pPr>
+              <a:lnSpc>
+                <a:spcPts val="4500"/>
+              </a:lnSpc>
+            </a:pPr>
             <a:endParaRPr lang="da-DK" altLang="en-DK" sz="3500" b="0" dirty="0">
               <a:solidFill>
                 <a:schemeClr val="tx1"/>
@@ -4629,7 +4465,7 @@
                   <a:srgbClr val="C00000"/>
                 </a:solidFill>
               </a:rPr>
-              <a:t>A representation of a motor cycle, as read on the encoder. </a:t>
+              <a:t>A representation of a motor cycle, as seen by the encoder</a:t>
             </a:r>
           </a:p>
         </p:txBody>
@@ -4700,318 +4536,17 @@
               </a:lnSpc>
             </a:pPr>
             <a:r>
-              <a:rPr lang="da-DK" altLang="en-DK" sz="1500" dirty="0"/>
-              <a:t>Figur 3</a:t>
-            </a:r>
-            <a:r>
-              <a:rPr lang="da-DK" altLang="en-DK" sz="1500" dirty="0">
+              <a:rPr lang="en-US" altLang="en-DK" sz="1500" dirty="0"/>
+              <a:t>Figure 3:</a:t>
+            </a:r>
+            <a:r>
+              <a:rPr lang="en-US" altLang="en-DK" sz="1500" dirty="0">
                 <a:solidFill>
                   <a:srgbClr val="BD2A33"/>
                 </a:solidFill>
               </a:rPr>
-              <a:t> The </a:t>
-            </a:r>
-            <a:r>
-              <a:rPr lang="da-DK" altLang="en-DK" sz="1500" dirty="0" err="1">
-                <a:solidFill>
-                  <a:srgbClr val="BD2A33"/>
-                </a:solidFill>
-              </a:rPr>
-              <a:t>main</a:t>
-            </a:r>
-            <a:r>
-              <a:rPr lang="da-DK" altLang="en-DK" sz="1500" dirty="0">
-                <a:solidFill>
-                  <a:srgbClr val="BD2A33"/>
-                </a:solidFill>
-              </a:rPr>
-              <a:t> loop of </a:t>
-            </a:r>
-            <a:r>
-              <a:rPr lang="da-DK" altLang="en-DK" sz="1500" dirty="0" err="1">
-                <a:solidFill>
-                  <a:srgbClr val="BD2A33"/>
-                </a:solidFill>
-              </a:rPr>
-              <a:t>our</a:t>
-            </a:r>
-            <a:r>
-              <a:rPr lang="da-DK" altLang="en-DK" sz="1500" dirty="0">
-                <a:solidFill>
-                  <a:srgbClr val="BD2A33"/>
-                </a:solidFill>
-              </a:rPr>
-              <a:t> </a:t>
-            </a:r>
-            <a:r>
-              <a:rPr lang="da-DK" altLang="en-DK" sz="1500" dirty="0" err="1">
-                <a:solidFill>
-                  <a:srgbClr val="BD2A33"/>
-                </a:solidFill>
-              </a:rPr>
-              <a:t>code</a:t>
-            </a:r>
-            <a:r>
-              <a:rPr lang="da-DK" altLang="en-DK" sz="1500" dirty="0">
-                <a:solidFill>
-                  <a:srgbClr val="BD2A33"/>
-                </a:solidFill>
-              </a:rPr>
-              <a:t>, the big </a:t>
-            </a:r>
-            <a:r>
-              <a:rPr lang="da-DK" altLang="en-DK" sz="1500" dirty="0" err="1">
-                <a:solidFill>
-                  <a:srgbClr val="BD2A33"/>
-                </a:solidFill>
-              </a:rPr>
-              <a:t>circle</a:t>
-            </a:r>
-            <a:r>
-              <a:rPr lang="da-DK" altLang="en-DK" sz="1500" dirty="0">
-                <a:solidFill>
-                  <a:srgbClr val="BD2A33"/>
-                </a:solidFill>
-              </a:rPr>
-              <a:t> </a:t>
-            </a:r>
-            <a:r>
-              <a:rPr lang="da-DK" altLang="en-DK" sz="1500" dirty="0" err="1">
-                <a:solidFill>
-                  <a:srgbClr val="BD2A33"/>
-                </a:solidFill>
-              </a:rPr>
-              <a:t>represents</a:t>
-            </a:r>
-            <a:r>
-              <a:rPr lang="da-DK" altLang="en-DK" sz="1500" dirty="0">
-                <a:solidFill>
-                  <a:srgbClr val="BD2A33"/>
-                </a:solidFill>
-              </a:rPr>
-              <a:t> the </a:t>
-            </a:r>
-            <a:r>
-              <a:rPr lang="da-DK" altLang="en-DK" sz="1500" dirty="0" err="1">
-                <a:solidFill>
-                  <a:srgbClr val="BD2A33"/>
-                </a:solidFill>
-              </a:rPr>
-              <a:t>code</a:t>
-            </a:r>
-            <a:r>
-              <a:rPr lang="da-DK" altLang="en-DK" sz="1500" dirty="0">
-                <a:solidFill>
-                  <a:srgbClr val="BD2A33"/>
-                </a:solidFill>
-              </a:rPr>
-              <a:t> </a:t>
-            </a:r>
-            <a:r>
-              <a:rPr lang="da-DK" altLang="en-DK" sz="1500" dirty="0" err="1">
-                <a:solidFill>
-                  <a:srgbClr val="BD2A33"/>
-                </a:solidFill>
-              </a:rPr>
-              <a:t>which</a:t>
-            </a:r>
-            <a:r>
-              <a:rPr lang="da-DK" altLang="en-DK" sz="1500" dirty="0">
-                <a:solidFill>
-                  <a:srgbClr val="BD2A33"/>
-                </a:solidFill>
-              </a:rPr>
-              <a:t> is </a:t>
-            </a:r>
-            <a:r>
-              <a:rPr lang="da-DK" altLang="en-DK" sz="1500" dirty="0" err="1">
-                <a:solidFill>
-                  <a:srgbClr val="BD2A33"/>
-                </a:solidFill>
-              </a:rPr>
-              <a:t>continously</a:t>
-            </a:r>
-            <a:r>
-              <a:rPr lang="da-DK" altLang="en-DK" sz="1500" dirty="0">
-                <a:solidFill>
-                  <a:srgbClr val="BD2A33"/>
-                </a:solidFill>
-              </a:rPr>
-              <a:t> running in the </a:t>
-            </a:r>
-            <a:r>
-              <a:rPr lang="da-DK" altLang="en-DK" sz="1500" dirty="0" err="1">
-                <a:solidFill>
-                  <a:srgbClr val="BD2A33"/>
-                </a:solidFill>
-              </a:rPr>
-              <a:t>main</a:t>
-            </a:r>
-            <a:r>
-              <a:rPr lang="da-DK" altLang="en-DK" sz="1500" dirty="0">
-                <a:solidFill>
-                  <a:srgbClr val="BD2A33"/>
-                </a:solidFill>
-              </a:rPr>
-              <a:t> loop, </a:t>
-            </a:r>
-            <a:r>
-              <a:rPr lang="da-DK" altLang="en-DK" sz="1500" dirty="0" err="1">
-                <a:solidFill>
-                  <a:srgbClr val="BD2A33"/>
-                </a:solidFill>
-              </a:rPr>
-              <a:t>while</a:t>
-            </a:r>
-            <a:r>
-              <a:rPr lang="da-DK" altLang="en-DK" sz="1500" dirty="0">
-                <a:solidFill>
-                  <a:srgbClr val="BD2A33"/>
-                </a:solidFill>
-              </a:rPr>
-              <a:t> all the </a:t>
-            </a:r>
-            <a:r>
-              <a:rPr lang="da-DK" altLang="en-DK" sz="1500" dirty="0" err="1">
-                <a:solidFill>
-                  <a:srgbClr val="BD2A33"/>
-                </a:solidFill>
-              </a:rPr>
-              <a:t>boxes</a:t>
-            </a:r>
-            <a:r>
-              <a:rPr lang="da-DK" altLang="en-DK" sz="1500" dirty="0">
-                <a:solidFill>
-                  <a:srgbClr val="BD2A33"/>
-                </a:solidFill>
-              </a:rPr>
-              <a:t> to the right </a:t>
-            </a:r>
-            <a:r>
-              <a:rPr lang="da-DK" altLang="en-DK" sz="1500" dirty="0" err="1">
-                <a:solidFill>
-                  <a:srgbClr val="BD2A33"/>
-                </a:solidFill>
-              </a:rPr>
-              <a:t>represent</a:t>
-            </a:r>
-            <a:r>
-              <a:rPr lang="da-DK" altLang="en-DK" sz="1500" dirty="0">
-                <a:solidFill>
-                  <a:srgbClr val="BD2A33"/>
-                </a:solidFill>
-              </a:rPr>
-              <a:t> the </a:t>
-            </a:r>
-            <a:r>
-              <a:rPr lang="da-DK" altLang="en-DK" sz="1500" dirty="0" err="1">
-                <a:solidFill>
-                  <a:srgbClr val="BD2A33"/>
-                </a:solidFill>
-              </a:rPr>
-              <a:t>various</a:t>
-            </a:r>
-            <a:r>
-              <a:rPr lang="da-DK" altLang="en-DK" sz="1500" dirty="0">
-                <a:solidFill>
-                  <a:srgbClr val="BD2A33"/>
-                </a:solidFill>
-              </a:rPr>
-              <a:t> </a:t>
-            </a:r>
-            <a:r>
-              <a:rPr lang="da-DK" altLang="en-DK" sz="1500" dirty="0" err="1">
-                <a:solidFill>
-                  <a:srgbClr val="BD2A33"/>
-                </a:solidFill>
-              </a:rPr>
-              <a:t>interrupt</a:t>
-            </a:r>
-            <a:r>
-              <a:rPr lang="da-DK" altLang="en-DK" sz="1500" dirty="0">
-                <a:solidFill>
-                  <a:srgbClr val="BD2A33"/>
-                </a:solidFill>
-              </a:rPr>
-              <a:t> service rutines, with the labels on the </a:t>
-            </a:r>
-            <a:r>
-              <a:rPr lang="da-DK" altLang="en-DK" sz="1500" dirty="0" err="1">
-                <a:solidFill>
-                  <a:srgbClr val="BD2A33"/>
-                </a:solidFill>
-              </a:rPr>
-              <a:t>arrows</a:t>
-            </a:r>
-            <a:r>
-              <a:rPr lang="da-DK" altLang="en-DK" sz="1500" dirty="0">
-                <a:solidFill>
-                  <a:srgbClr val="BD2A33"/>
-                </a:solidFill>
-              </a:rPr>
-              <a:t> </a:t>
-            </a:r>
-            <a:r>
-              <a:rPr lang="da-DK" altLang="en-DK" sz="1500" dirty="0" err="1">
-                <a:solidFill>
-                  <a:srgbClr val="BD2A33"/>
-                </a:solidFill>
-              </a:rPr>
-              <a:t>referring</a:t>
-            </a:r>
-            <a:r>
-              <a:rPr lang="da-DK" altLang="en-DK" sz="1500" dirty="0">
-                <a:solidFill>
-                  <a:srgbClr val="BD2A33"/>
-                </a:solidFill>
-              </a:rPr>
-              <a:t> to the </a:t>
-            </a:r>
-            <a:r>
-              <a:rPr lang="da-DK" altLang="en-DK" sz="1500" dirty="0" err="1">
-                <a:solidFill>
-                  <a:srgbClr val="BD2A33"/>
-                </a:solidFill>
-              </a:rPr>
-              <a:t>condition</a:t>
-            </a:r>
-            <a:r>
-              <a:rPr lang="da-DK" altLang="en-DK" sz="1500" dirty="0">
-                <a:solidFill>
-                  <a:srgbClr val="BD2A33"/>
-                </a:solidFill>
-              </a:rPr>
-              <a:t> </a:t>
-            </a:r>
-            <a:r>
-              <a:rPr lang="da-DK" altLang="en-DK" sz="1500" dirty="0" err="1">
-                <a:solidFill>
-                  <a:srgbClr val="BD2A33"/>
-                </a:solidFill>
-              </a:rPr>
-              <a:t>that</a:t>
-            </a:r>
-            <a:r>
-              <a:rPr lang="da-DK" altLang="en-DK" sz="1500" dirty="0">
-                <a:solidFill>
-                  <a:srgbClr val="BD2A33"/>
-                </a:solidFill>
-              </a:rPr>
-              <a:t> triggers the </a:t>
-            </a:r>
-            <a:r>
-              <a:rPr lang="da-DK" altLang="en-DK" sz="1500" dirty="0" err="1">
-                <a:solidFill>
-                  <a:srgbClr val="BD2A33"/>
-                </a:solidFill>
-              </a:rPr>
-              <a:t>interrupt</a:t>
-            </a:r>
-            <a:endParaRPr lang="da-DK" altLang="en-DK" sz="1500" dirty="0">
-              <a:solidFill>
-                <a:srgbClr val="BD2A33"/>
-              </a:solidFill>
-            </a:endParaRPr>
+              <a:t> The main loop of our code. The big circle represents the code which is continuously running in the main loop, while all the boxes to the right represent the various interrupt service routines, with the labels on the arrows referring to the condition that triggers the interrupt</a:t>
+            </a:r>
           </a:p>
         </p:txBody>
       </p:sp>
@@ -5031,8 +4566,8 @@
         </p:nvSpPr>
         <p:spPr bwMode="auto">
           <a:xfrm>
-            <a:off x="9908684" y="23309811"/>
-            <a:ext cx="4566762" cy="642879"/>
+            <a:off x="8433385" y="23228836"/>
+            <a:ext cx="7364279" cy="642879"/>
           </a:xfrm>
           <a:prstGeom prst="rect">
             <a:avLst/>
@@ -5081,64 +4616,32 @@
               </a:lnSpc>
             </a:pPr>
             <a:r>
-              <a:rPr lang="da-DK" altLang="en-DK" sz="1500" dirty="0"/>
-              <a:t>Figur 2</a:t>
-            </a:r>
-            <a:r>
-              <a:rPr lang="da-DK" altLang="en-DK" sz="1500" dirty="0">
+              <a:rPr lang="en-US" altLang="en-DK" sz="1500" dirty="0"/>
+              <a:t>Figure 2:</a:t>
+            </a:r>
+            <a:r>
+              <a:rPr lang="en-US" altLang="en-DK" sz="1500" dirty="0">
                 <a:solidFill>
                   <a:srgbClr val="BD2A33"/>
                 </a:solidFill>
               </a:rPr>
-              <a:t> The </a:t>
-            </a:r>
-            <a:r>
-              <a:rPr lang="da-DK" altLang="en-DK" sz="1500" dirty="0" err="1">
+              <a:t> The current going into the old system, called RIO + </a:t>
+            </a:r>
+            <a:r>
+              <a:rPr lang="en-US" altLang="en-DK" sz="1500" dirty="0" err="1">
                 <a:solidFill>
                   <a:srgbClr val="BD2A33"/>
                 </a:solidFill>
               </a:rPr>
-              <a:t>current</a:t>
-            </a:r>
-            <a:r>
-              <a:rPr lang="da-DK" altLang="en-DK" sz="1500" dirty="0">
+              <a:t>motorboard</a:t>
+            </a:r>
+            <a:r>
+              <a:rPr lang="en-US" altLang="en-DK" sz="1500" dirty="0">
                 <a:solidFill>
                   <a:srgbClr val="BD2A33"/>
                 </a:solidFill>
               </a:rPr>
-              <a:t> </a:t>
-            </a:r>
-            <a:r>
-              <a:rPr lang="da-DK" altLang="en-DK" sz="1500" dirty="0" err="1">
-                <a:solidFill>
-                  <a:srgbClr val="BD2A33"/>
-                </a:solidFill>
-              </a:rPr>
-              <a:t>going</a:t>
-            </a:r>
-            <a:r>
-              <a:rPr lang="da-DK" altLang="en-DK" sz="1500" dirty="0">
-                <a:solidFill>
-                  <a:srgbClr val="BD2A33"/>
-                </a:solidFill>
-              </a:rPr>
-              <a:t> </a:t>
-            </a:r>
-            <a:r>
-              <a:rPr lang="da-DK" altLang="en-DK" sz="1500" dirty="0" err="1">
-                <a:solidFill>
-                  <a:srgbClr val="BD2A33"/>
-                </a:solidFill>
-              </a:rPr>
-              <a:t>into</a:t>
-            </a:r>
-            <a:r>
-              <a:rPr lang="da-DK" altLang="en-DK" sz="1500" dirty="0">
-                <a:solidFill>
-                  <a:srgbClr val="BD2A33"/>
-                </a:solidFill>
-              </a:rPr>
-              <a:t> the ECU and the RIO</a:t>
+              <a:t>, and the current going into our embedded system.</a:t>
             </a:r>
           </a:p>
         </p:txBody>
@@ -5158,7 +4661,7 @@
           <p:nvPr/>
         </p:nvPicPr>
         <p:blipFill>
-          <a:blip r:embed="rId4">
+          <a:blip r:embed="rId3">
             <a:extLst>
               <a:ext uri="{28A0092B-C50C-407E-A947-70E740481C1C}">
                 <a14:useLocalDpi xmlns:a14="http://schemas.microsoft.com/office/drawing/2010/main" val="0"/>
@@ -5485,21 +4988,6 @@
               </a:rPr>
               <a:t> extension necessary for compiling code the Teensy can run.</a:t>
             </a:r>
-            <a:br>
-              <a:rPr lang="en-US" altLang="en-DK" sz="3500" b="0" dirty="0">
-                <a:solidFill>
-                  <a:schemeClr val="tx1"/>
-                </a:solidFill>
-              </a:rPr>
-            </a:br>
-            <a:r>
-              <a:rPr lang="en-US" altLang="en-DK" sz="3500" b="0" dirty="0">
-                <a:solidFill>
-                  <a:schemeClr val="tx1"/>
-                </a:solidFill>
-              </a:rPr>
-              <a:t>When we found the standard functions insufficient we found and adapted open source libraries, or created our own. </a:t>
-            </a:r>
           </a:p>
           <a:p>
             <a:pPr>
@@ -5513,6 +5001,21 @@
                   <a:schemeClr val="tx1"/>
                 </a:solidFill>
               </a:rPr>
+              <a:t>The main part of the code is run sequentially, while critical parts of the program was prioritized using interrupt service routines.</a:t>
+            </a:r>
+          </a:p>
+          <a:p>
+            <a:pPr>
+              <a:lnSpc>
+                <a:spcPts val="4500"/>
+              </a:lnSpc>
+            </a:pPr>
+            <a:r>
+              <a:rPr lang="en-US" altLang="en-DK" sz="3500" b="0" dirty="0">
+                <a:solidFill>
+                  <a:schemeClr val="tx1"/>
+                </a:solidFill>
+              </a:rPr>
               <a:t>An overview of our code structure can be seen in figure 3.</a:t>
             </a:r>
             <a:endParaRPr lang="da-DK" altLang="en-DK" sz="3500" b="0" dirty="0">
@@ -5539,8 +5042,8 @@
         </p:nvSpPr>
         <p:spPr bwMode="auto">
           <a:xfrm>
-            <a:off x="16333670" y="10072689"/>
-            <a:ext cx="13061331" cy="9815955"/>
+            <a:off x="16333670" y="10072690"/>
+            <a:ext cx="13061331" cy="7446934"/>
           </a:xfrm>
           <a:prstGeom prst="rect">
             <a:avLst/>
@@ -5736,7 +5239,7 @@
               </a:lnSpc>
             </a:pPr>
             <a:r>
-              <a:rPr lang="da-DK" altLang="en-DK" sz="4500" dirty="0" err="1">
+              <a:rPr lang="en-US" altLang="en-DK" sz="4500" dirty="0">
                 <a:solidFill>
                   <a:srgbClr val="C00000"/>
                 </a:solidFill>
@@ -5765,7 +5268,7 @@
                   <a:schemeClr val="tx1"/>
                 </a:solidFill>
               </a:rPr>
-              <a:t>In order to replace the RIO, we had to implement the following features:</a:t>
+              <a:t>In order to replace the existing engine control unit, we had to implement the following features:</a:t>
             </a:r>
           </a:p>
           <a:p>
@@ -5799,7 +5302,7 @@
                   <a:schemeClr val="tx1"/>
                 </a:solidFill>
               </a:rPr>
-              <a:t>Make the starter motor run until the engine is ready to take over</a:t>
+              <a:t>Control the starter motor until the engine is ready to take over</a:t>
             </a:r>
           </a:p>
           <a:p>
@@ -5816,7 +5319,7 @@
                   <a:schemeClr val="tx1"/>
                 </a:solidFill>
               </a:rPr>
-              <a:t>Control gear</a:t>
+              <a:t>Control the gear</a:t>
             </a:r>
           </a:p>
           <a:p>
@@ -5833,7 +5336,7 @@
                   <a:schemeClr val="tx1"/>
                 </a:solidFill>
               </a:rPr>
-              <a:t>Monitor and calculate values such as speed and temperature</a:t>
+              <a:t>Monitor sensor values, such as battery voltage and temperature</a:t>
             </a:r>
           </a:p>
           <a:p>
@@ -5850,21 +5353,8 @@
                   <a:schemeClr val="tx1"/>
                 </a:solidFill>
               </a:rPr>
-              <a:t>Communicate over </a:t>
-            </a:r>
-            <a:r>
-              <a:rPr lang="en-US" altLang="en-DK" sz="3500" b="0" dirty="0" err="1">
-                <a:solidFill>
-                  <a:schemeClr val="tx1"/>
-                </a:solidFill>
-              </a:rPr>
-              <a:t>CANbus</a:t>
-            </a:r>
-            <a:endParaRPr lang="en-US" altLang="en-DK" sz="3500" b="0" dirty="0">
-              <a:solidFill>
-                <a:schemeClr val="tx1"/>
-              </a:solidFill>
-            </a:endParaRPr>
+              <a:t>Communicate over CAN-bus</a:t>
+            </a:r>
           </a:p>
           <a:p>
             <a:pPr marL="457200" indent="-457200">
@@ -5897,7 +5387,7 @@
                   <a:schemeClr val="tx1"/>
                 </a:solidFill>
               </a:rPr>
-              <a:t>Log data on SD card</a:t>
+              <a:t>Log data on a SD card</a:t>
             </a:r>
           </a:p>
           <a:p>
@@ -5931,7 +5421,7 @@
                   <a:schemeClr val="tx1"/>
                 </a:solidFill>
               </a:rPr>
-              <a:t>Only drive when a continuous signal is received from the driver</a:t>
+              <a:t>Halt the engine when no signal is received from the driver</a:t>
             </a:r>
           </a:p>
         </p:txBody>
@@ -5951,7 +5441,7 @@
           <p:nvPr/>
         </p:nvPicPr>
         <p:blipFill>
-          <a:blip r:embed="rId4">
+          <a:blip r:embed="rId3">
             <a:extLst>
               <a:ext uri="{28A0092B-C50C-407E-A947-70E740481C1C}">
                 <a14:useLocalDpi xmlns:a14="http://schemas.microsoft.com/office/drawing/2010/main" val="0"/>
@@ -6011,13 +5501,13 @@
           <p:nvPr/>
         </p:nvPicPr>
         <p:blipFill>
-          <a:blip r:embed="rId5">
+          <a:blip r:embed="rId4">
             <a:extLst>
               <a:ext uri="{28A0092B-C50C-407E-A947-70E740481C1C}">
                 <a14:useLocalDpi xmlns:a14="http://schemas.microsoft.com/office/drawing/2010/main" val="0"/>
               </a:ext>
               <a:ext uri="{96DAC541-7B7A-43D3-8B79-37D633B846F1}">
-                <asvg:svgBlip xmlns:asvg="http://schemas.microsoft.com/office/drawing/2016/SVG/main" r:embed="rId6"/>
+                <asvg:svgBlip xmlns:asvg="http://schemas.microsoft.com/office/drawing/2016/SVG/main" r:embed="rId5"/>
               </a:ext>
             </a:extLst>
           </a:blip>
@@ -7870,10 +7360,10 @@
       </p:sp>
       <p:pic>
         <p:nvPicPr>
-          <p:cNvPr id="24" name="Grafik 23">
-            <a:extLst>
-              <a:ext uri="{FF2B5EF4-FFF2-40B4-BE49-F238E27FC236}">
-                <a16:creationId xmlns:a16="http://schemas.microsoft.com/office/drawing/2014/main" id="{90287123-4EBB-487B-B9C3-D58522574692}"/>
+          <p:cNvPr id="27" name="Grafik 26">
+            <a:extLst>
+              <a:ext uri="{FF2B5EF4-FFF2-40B4-BE49-F238E27FC236}">
+                <a16:creationId xmlns:a16="http://schemas.microsoft.com/office/drawing/2014/main" id="{47F6D645-CB1C-42E5-A663-50B233E808E3}"/>
               </a:ext>
             </a:extLst>
           </p:cNvPr>
@@ -7883,13 +7373,13 @@
           <p:nvPr/>
         </p:nvPicPr>
         <p:blipFill>
-          <a:blip r:embed="rId7">
+          <a:blip r:embed="rId6">
             <a:extLst>
               <a:ext uri="{28A0092B-C50C-407E-A947-70E740481C1C}">
                 <a14:useLocalDpi xmlns:a14="http://schemas.microsoft.com/office/drawing/2010/main" val="0"/>
               </a:ext>
               <a:ext uri="{96DAC541-7B7A-43D3-8B79-37D633B846F1}">
-                <asvg:svgBlip xmlns:asvg="http://schemas.microsoft.com/office/drawing/2016/SVG/main" r:embed="rId8"/>
+                <asvg:svgBlip xmlns:asvg="http://schemas.microsoft.com/office/drawing/2016/SVG/main" r:embed="rId7"/>
               </a:ext>
             </a:extLst>
           </a:blip>
@@ -7899,51 +7389,20 @@
         </p:blipFill>
         <p:spPr>
           <a:xfrm>
-            <a:off x="1279623" y="21106616"/>
-            <a:ext cx="6680188" cy="5993440"/>
+            <a:off x="8413222" y="17522604"/>
+            <a:ext cx="7387088" cy="5540316"/>
           </a:xfrm>
           <a:prstGeom prst="rect">
             <a:avLst/>
           </a:prstGeom>
-        </p:spPr>
-      </p:pic>
-      <p:pic>
-        <p:nvPicPr>
-          <p:cNvPr id="27" name="Grafik 26">
-            <a:extLst>
-              <a:ext uri="{FF2B5EF4-FFF2-40B4-BE49-F238E27FC236}">
-                <a16:creationId xmlns:a16="http://schemas.microsoft.com/office/drawing/2014/main" id="{47F6D645-CB1C-42E5-A663-50B233E808E3}"/>
-              </a:ext>
-            </a:extLst>
-          </p:cNvPr>
-          <p:cNvPicPr>
-            <a:picLocks noChangeAspect="1"/>
-          </p:cNvPicPr>
-          <p:nvPr/>
-        </p:nvPicPr>
-        <p:blipFill>
-          <a:blip r:embed="rId9">
-            <a:extLst>
-              <a:ext uri="{28A0092B-C50C-407E-A947-70E740481C1C}">
-                <a14:useLocalDpi xmlns:a14="http://schemas.microsoft.com/office/drawing/2010/main" val="0"/>
-              </a:ext>
-              <a:ext uri="{96DAC541-7B7A-43D3-8B79-37D633B846F1}">
-                <asvg:svgBlip xmlns:asvg="http://schemas.microsoft.com/office/drawing/2016/SVG/main" r:embed="rId10"/>
-              </a:ext>
-            </a:extLst>
-          </a:blip>
-          <a:stretch>
-            <a:fillRect/>
-          </a:stretch>
-        </p:blipFill>
-        <p:spPr>
-          <a:xfrm>
-            <a:off x="8413222" y="17522604"/>
-            <a:ext cx="7387088" cy="5540316"/>
-          </a:xfrm>
-          <a:prstGeom prst="rect">
-            <a:avLst/>
-          </a:prstGeom>
+          <a:effectLst>
+            <a:glow rad="63500">
+              <a:schemeClr val="accent4">
+                <a:satMod val="175000"/>
+                <a:alpha val="40000"/>
+              </a:schemeClr>
+            </a:glow>
+          </a:effectLst>
         </p:spPr>
       </p:pic>
       <p:sp>
@@ -7961,7 +7420,7 @@
         <p:spPr>
           <a:xfrm>
             <a:off x="1206494" y="28381886"/>
-            <a:ext cx="7140278" cy="4708981"/>
+            <a:ext cx="7140278" cy="6975179"/>
           </a:xfrm>
           <a:prstGeom prst="rect">
             <a:avLst/>
@@ -7980,7 +7439,7 @@
             </a:pPr>
             <a:r>
               <a:rPr lang="en-US" altLang="en-DK" sz="3500" dirty="0"/>
-              <a:t>The numbers refer to the following:</a:t>
+              <a:t>The numbers on figure 1 refer to the following:</a:t>
             </a:r>
           </a:p>
           <a:p>
@@ -8043,7 +7502,18 @@
             </a:pPr>
             <a:r>
               <a:rPr lang="en-US" altLang="en-DK" sz="3500" dirty="0"/>
-              <a:t>Note that the Z-pulse is placed at an arbitrary angle.</a:t>
+              <a:t>Note that the Z-pulse position can change based on how the encoder was mounted on the engine.</a:t>
+            </a:r>
+          </a:p>
+          <a:p>
+            <a:pPr>
+              <a:lnSpc>
+                <a:spcPts val="4500"/>
+              </a:lnSpc>
+            </a:pPr>
+            <a:r>
+              <a:rPr lang="en-US" altLang="en-DK" sz="3500" dirty="0"/>
+              <a:t>This displacement is accounted for in the calibration of the engine.</a:t>
             </a:r>
           </a:p>
         </p:txBody>
@@ -8064,7 +7534,7 @@
         </p:nvSpPr>
         <p:spPr bwMode="auto">
           <a:xfrm>
-            <a:off x="8422144" y="29136420"/>
+            <a:off x="8611061" y="33018492"/>
             <a:ext cx="7494245" cy="5643603"/>
           </a:xfrm>
           <a:prstGeom prst="rect">
@@ -8312,7 +7782,7 @@
                   <a:schemeClr val="tx1"/>
                 </a:solidFill>
               </a:rPr>
-              <a:t>This project was written on a Teensy 3.6, which controlled a PCB with various outlets to hook up the board to the rest of the car.</a:t>
+              <a:t>This project was programmed for a Teensy 3.6, which controlled a custom designed PCB, connected through various outlets to the rest of the car.</a:t>
             </a:r>
             <a:br>
               <a:rPr lang="en-US" altLang="en-DK" sz="3500" b="0" dirty="0">
@@ -8327,8 +7797,15 @@
                   <a:schemeClr val="tx1"/>
                 </a:solidFill>
               </a:rPr>
-              <a:t>The board was stored in a chassis which we 3D-printet</a:t>
-            </a:r>
+              <a:t>The custom PCB also features a built-in OLED screen and a buzzer, both used for debugging.</a:t>
+            </a:r>
+          </a:p>
+          <a:p>
+            <a:pPr>
+              <a:lnSpc>
+                <a:spcPts val="4500"/>
+              </a:lnSpc>
+            </a:pPr>
             <a:endParaRPr lang="da-DK" altLang="en-DK" sz="3500" b="0" dirty="0">
               <a:solidFill>
                 <a:schemeClr val="tx1"/>
@@ -8352,13 +7829,13 @@
           <p:nvPr/>
         </p:nvPicPr>
         <p:blipFill>
-          <a:blip r:embed="rId11">
+          <a:blip r:embed="rId8">
             <a:extLst>
               <a:ext uri="{28A0092B-C50C-407E-A947-70E740481C1C}">
                 <a14:useLocalDpi xmlns:a14="http://schemas.microsoft.com/office/drawing/2010/main" val="0"/>
               </a:ext>
               <a:ext uri="{96DAC541-7B7A-43D3-8B79-37D633B846F1}">
-                <asvg:svgBlip xmlns:asvg="http://schemas.microsoft.com/office/drawing/2016/SVG/main" r:embed="rId12"/>
+                <asvg:svgBlip xmlns:asvg="http://schemas.microsoft.com/office/drawing/2016/SVG/main" r:embed="rId9"/>
               </a:ext>
             </a:extLst>
           </a:blip>
@@ -8374,6 +7851,49 @@
           <a:prstGeom prst="rect">
             <a:avLst/>
           </a:prstGeom>
+        </p:spPr>
+      </p:pic>
+      <p:pic>
+        <p:nvPicPr>
+          <p:cNvPr id="5" name="Billede 4">
+            <a:extLst>
+              <a:ext uri="{FF2B5EF4-FFF2-40B4-BE49-F238E27FC236}">
+                <a16:creationId xmlns:a16="http://schemas.microsoft.com/office/drawing/2014/main" id="{87367386-B9E5-44EB-AD36-8CCD60EAC7E3}"/>
+              </a:ext>
+            </a:extLst>
+          </p:cNvPr>
+          <p:cNvPicPr>
+            <a:picLocks noChangeAspect="1"/>
+          </p:cNvPicPr>
+          <p:nvPr/>
+        </p:nvPicPr>
+        <p:blipFill rotWithShape="1">
+          <a:blip r:embed="rId10">
+            <a:extLst>
+              <a:ext uri="{28A0092B-C50C-407E-A947-70E740481C1C}">
+                <a14:useLocalDpi xmlns:a14="http://schemas.microsoft.com/office/drawing/2010/main" val="0"/>
+              </a:ext>
+            </a:extLst>
+          </a:blip>
+          <a:srcRect l="1805" b="10191"/>
+          <a:stretch/>
+        </p:blipFill>
+        <p:spPr>
+          <a:xfrm>
+            <a:off x="1202810" y="21125976"/>
+            <a:ext cx="6767133" cy="6020424"/>
+          </a:xfrm>
+          <a:prstGeom prst="rect">
+            <a:avLst/>
+          </a:prstGeom>
+          <a:effectLst>
+            <a:glow rad="63500">
+              <a:schemeClr val="accent4">
+                <a:satMod val="175000"/>
+                <a:alpha val="40000"/>
+              </a:schemeClr>
+            </a:glow>
+          </a:effectLst>
         </p:spPr>
       </p:pic>
     </p:spTree>

</xml_diff>